<commit_message>
add python code to Number System PPT for demostrating data conversion
</commit_message>
<xml_diff>
--- a/Morris_Worm/Morris_Forensics.pptx
+++ b/Morris_Worm/Morris_Forensics.pptx
@@ -5,26 +5,36 @@
     <p:sldMasterId id="2147483648" r:id="rId1"/>
   </p:sldMasterIdLst>
   <p:notesMasterIdLst>
-    <p:notesMasterId r:id="rId19"/>
+    <p:notesMasterId r:id="rId29"/>
   </p:notesMasterIdLst>
   <p:sldIdLst>
     <p:sldId id="256" r:id="rId2"/>
     <p:sldId id="272" r:id="rId3"/>
-    <p:sldId id="274" r:id="rId4"/>
-    <p:sldId id="261" r:id="rId5"/>
-    <p:sldId id="269" r:id="rId6"/>
-    <p:sldId id="270" r:id="rId7"/>
-    <p:sldId id="275" r:id="rId8"/>
-    <p:sldId id="268" r:id="rId9"/>
-    <p:sldId id="273" r:id="rId10"/>
-    <p:sldId id="257" r:id="rId11"/>
-    <p:sldId id="258" r:id="rId12"/>
-    <p:sldId id="259" r:id="rId13"/>
-    <p:sldId id="260" r:id="rId14"/>
-    <p:sldId id="262" r:id="rId15"/>
-    <p:sldId id="264" r:id="rId16"/>
-    <p:sldId id="267" r:id="rId17"/>
-    <p:sldId id="271" r:id="rId18"/>
+    <p:sldId id="276" r:id="rId4"/>
+    <p:sldId id="277" r:id="rId5"/>
+    <p:sldId id="286" r:id="rId6"/>
+    <p:sldId id="279" r:id="rId7"/>
+    <p:sldId id="280" r:id="rId8"/>
+    <p:sldId id="281" r:id="rId9"/>
+    <p:sldId id="282" r:id="rId10"/>
+    <p:sldId id="283" r:id="rId11"/>
+    <p:sldId id="284" r:id="rId12"/>
+    <p:sldId id="285" r:id="rId13"/>
+    <p:sldId id="274" r:id="rId14"/>
+    <p:sldId id="261" r:id="rId15"/>
+    <p:sldId id="269" r:id="rId16"/>
+    <p:sldId id="270" r:id="rId17"/>
+    <p:sldId id="275" r:id="rId18"/>
+    <p:sldId id="268" r:id="rId19"/>
+    <p:sldId id="273" r:id="rId20"/>
+    <p:sldId id="257" r:id="rId21"/>
+    <p:sldId id="258" r:id="rId22"/>
+    <p:sldId id="259" r:id="rId23"/>
+    <p:sldId id="260" r:id="rId24"/>
+    <p:sldId id="262" r:id="rId25"/>
+    <p:sldId id="264" r:id="rId26"/>
+    <p:sldId id="267" r:id="rId27"/>
+    <p:sldId id="271" r:id="rId28"/>
   </p:sldIdLst>
   <p:sldSz cx="12192000" cy="6858000"/>
   <p:notesSz cx="6858000" cy="9144000"/>
@@ -134,7 +144,7 @@
 <file path=ppt/revisionInfo.xml><?xml version="1.0" encoding="utf-8"?>
 <p1510:revInfo xmlns:a="http://schemas.openxmlformats.org/drawingml/2006/main" xmlns:r="http://schemas.openxmlformats.org/officeDocument/2006/relationships" xmlns:p1510="http://schemas.microsoft.com/office/powerpoint/2015/10/main">
   <p1510:revLst>
-    <p1510:client id="{A8585D3D-BBB5-49ED-BAF1-BD44A9B37397}" v="36" dt="2022-08-04T12:39:24.586"/>
+    <p1510:client id="{A8585D3D-BBB5-49ED-BAF1-BD44A9B37397}" v="48" dt="2023-01-24T01:31:33.445"/>
   </p1510:revLst>
 </p1510:revInfo>
 </file>
@@ -7942,7 +7952,7 @@
   <pc:docChgLst>
     <pc:chgData name="Weifeng Xu" userId="e7aed605-a3dd-4d5a-a692-a87037af107b" providerId="ADAL" clId="{A8585D3D-BBB5-49ED-BAF1-BD44A9B37397}"/>
     <pc:docChg chg="undo custSel addSld delSld modSld sldOrd">
-      <pc:chgData name="Weifeng Xu" userId="e7aed605-a3dd-4d5a-a692-a87037af107b" providerId="ADAL" clId="{A8585D3D-BBB5-49ED-BAF1-BD44A9B37397}" dt="2022-08-04T12:44:35.684" v="1548" actId="14100"/>
+      <pc:chgData name="Weifeng Xu" userId="e7aed605-a3dd-4d5a-a692-a87037af107b" providerId="ADAL" clId="{A8585D3D-BBB5-49ED-BAF1-BD44A9B37397}" dt="2023-01-24T01:59:12.651" v="1993" actId="14100"/>
       <pc:docMkLst>
         <pc:docMk/>
       </pc:docMkLst>
@@ -9055,7 +9065,7 @@
         </pc:cxnChg>
       </pc:sldChg>
       <pc:sldChg chg="addSp modSp new mod">
-        <pc:chgData name="Weifeng Xu" userId="e7aed605-a3dd-4d5a-a692-a87037af107b" providerId="ADAL" clId="{A8585D3D-BBB5-49ED-BAF1-BD44A9B37397}" dt="2022-08-04T02:34:16.233" v="1291" actId="20577"/>
+        <pc:chgData name="Weifeng Xu" userId="e7aed605-a3dd-4d5a-a692-a87037af107b" providerId="ADAL" clId="{A8585D3D-BBB5-49ED-BAF1-BD44A9B37397}" dt="2023-01-24T01:59:12.651" v="1993" actId="14100"/>
         <pc:sldMkLst>
           <pc:docMk/>
           <pc:sldMk cId="2049237961" sldId="269"/>
@@ -9084,6 +9094,14 @@
             <ac:spMk id="8" creationId="{82EAB93D-6235-E491-1766-A4C8E7C1ECDB}"/>
           </ac:spMkLst>
         </pc:spChg>
+        <pc:spChg chg="add mod">
+          <ac:chgData name="Weifeng Xu" userId="e7aed605-a3dd-4d5a-a692-a87037af107b" providerId="ADAL" clId="{A8585D3D-BBB5-49ED-BAF1-BD44A9B37397}" dt="2023-01-24T01:58:45.984" v="1989" actId="108"/>
+          <ac:spMkLst>
+            <pc:docMk/>
+            <pc:sldMk cId="2049237961" sldId="269"/>
+            <ac:spMk id="12" creationId="{DA2AB511-C45D-67EE-80FB-1F0C24AAE108}"/>
+          </ac:spMkLst>
+        </pc:spChg>
         <pc:picChg chg="add mod">
           <ac:chgData name="Weifeng Xu" userId="e7aed605-a3dd-4d5a-a692-a87037af107b" providerId="ADAL" clId="{A8585D3D-BBB5-49ED-BAF1-BD44A9B37397}" dt="2022-08-04T02:01:38.621" v="1162" actId="1076"/>
           <ac:picMkLst>
@@ -9100,6 +9118,30 @@
             <ac:picMk id="5" creationId="{D872A1EC-D070-33F0-4C0A-20430FA7F90A}"/>
           </ac:picMkLst>
         </pc:picChg>
+        <pc:cxnChg chg="add mod">
+          <ac:chgData name="Weifeng Xu" userId="e7aed605-a3dd-4d5a-a692-a87037af107b" providerId="ADAL" clId="{A8585D3D-BBB5-49ED-BAF1-BD44A9B37397}" dt="2023-01-24T01:57:44.797" v="1959" actId="13822"/>
+          <ac:cxnSpMkLst>
+            <pc:docMk/>
+            <pc:sldMk cId="2049237961" sldId="269"/>
+            <ac:cxnSpMk id="4" creationId="{B09A4352-161F-A2B0-0AFF-0CB962704353}"/>
+          </ac:cxnSpMkLst>
+        </pc:cxnChg>
+        <pc:cxnChg chg="add mod">
+          <ac:chgData name="Weifeng Xu" userId="e7aed605-a3dd-4d5a-a692-a87037af107b" providerId="ADAL" clId="{A8585D3D-BBB5-49ED-BAF1-BD44A9B37397}" dt="2023-01-24T01:57:51.110" v="1961" actId="13822"/>
+          <ac:cxnSpMkLst>
+            <pc:docMk/>
+            <pc:sldMk cId="2049237961" sldId="269"/>
+            <ac:cxnSpMk id="10" creationId="{467E0FC3-4DD7-77E1-F1E2-9C904488D0AF}"/>
+          </ac:cxnSpMkLst>
+        </pc:cxnChg>
+        <pc:cxnChg chg="add mod">
+          <ac:chgData name="Weifeng Xu" userId="e7aed605-a3dd-4d5a-a692-a87037af107b" providerId="ADAL" clId="{A8585D3D-BBB5-49ED-BAF1-BD44A9B37397}" dt="2023-01-24T01:59:12.651" v="1993" actId="14100"/>
+          <ac:cxnSpMkLst>
+            <pc:docMk/>
+            <pc:sldMk cId="2049237961" sldId="269"/>
+            <ac:cxnSpMk id="14" creationId="{0DEA2B36-11DD-1077-93D3-A2AB31297FD2}"/>
+          </ac:cxnSpMkLst>
+        </pc:cxnChg>
       </pc:sldChg>
       <pc:sldChg chg="addSp modSp new mod ord">
         <pc:chgData name="Weifeng Xu" userId="e7aed605-a3dd-4d5a-a692-a87037af107b" providerId="ADAL" clId="{A8585D3D-BBB5-49ED-BAF1-BD44A9B37397}" dt="2022-08-04T02:35:14.173" v="1328" actId="20577"/>
@@ -9148,7 +9190,7 @@
         </pc:picChg>
       </pc:sldChg>
       <pc:sldChg chg="modSp new mod">
-        <pc:chgData name="Weifeng Xu" userId="e7aed605-a3dd-4d5a-a692-a87037af107b" providerId="ADAL" clId="{A8585D3D-BBB5-49ED-BAF1-BD44A9B37397}" dt="2022-08-04T11:39:22.970" v="1514" actId="20577"/>
+        <pc:chgData name="Weifeng Xu" userId="e7aed605-a3dd-4d5a-a692-a87037af107b" providerId="ADAL" clId="{A8585D3D-BBB5-49ED-BAF1-BD44A9B37397}" dt="2023-01-24T01:43:46.156" v="1945" actId="20577"/>
         <pc:sldMkLst>
           <pc:docMk/>
           <pc:sldMk cId="1965449657" sldId="272"/>
@@ -9162,7 +9204,7 @@
           </ac:spMkLst>
         </pc:spChg>
         <pc:spChg chg="mod">
-          <ac:chgData name="Weifeng Xu" userId="e7aed605-a3dd-4d5a-a692-a87037af107b" providerId="ADAL" clId="{A8585D3D-BBB5-49ED-BAF1-BD44A9B37397}" dt="2022-08-04T11:39:22.970" v="1514" actId="20577"/>
+          <ac:chgData name="Weifeng Xu" userId="e7aed605-a3dd-4d5a-a692-a87037af107b" providerId="ADAL" clId="{A8585D3D-BBB5-49ED-BAF1-BD44A9B37397}" dt="2023-01-24T01:43:46.156" v="1945" actId="20577"/>
           <ac:spMkLst>
             <pc:docMk/>
             <pc:sldMk cId="1965449657" sldId="272"/>
@@ -9194,7 +9236,7 @@
         </pc:spChg>
       </pc:sldChg>
       <pc:sldChg chg="addSp delSp modSp new mod modClrScheme chgLayout">
-        <pc:chgData name="Weifeng Xu" userId="e7aed605-a3dd-4d5a-a692-a87037af107b" providerId="ADAL" clId="{A8585D3D-BBB5-49ED-BAF1-BD44A9B37397}" dt="2022-08-04T11:45:30.300" v="1520" actId="20577"/>
+        <pc:chgData name="Weifeng Xu" userId="e7aed605-a3dd-4d5a-a692-a87037af107b" providerId="ADAL" clId="{A8585D3D-BBB5-49ED-BAF1-BD44A9B37397}" dt="2023-01-24T01:44:02.649" v="1947" actId="20577"/>
         <pc:sldMkLst>
           <pc:docMk/>
           <pc:sldMk cId="1402944920" sldId="274"/>
@@ -9216,7 +9258,7 @@
           </ac:spMkLst>
         </pc:spChg>
         <pc:spChg chg="add mod ord">
-          <ac:chgData name="Weifeng Xu" userId="e7aed605-a3dd-4d5a-a692-a87037af107b" providerId="ADAL" clId="{A8585D3D-BBB5-49ED-BAF1-BD44A9B37397}" dt="2022-08-04T11:45:30.300" v="1520" actId="20577"/>
+          <ac:chgData name="Weifeng Xu" userId="e7aed605-a3dd-4d5a-a692-a87037af107b" providerId="ADAL" clId="{A8585D3D-BBB5-49ED-BAF1-BD44A9B37397}" dt="2023-01-24T01:44:02.649" v="1947" actId="20577"/>
           <ac:spMkLst>
             <pc:docMk/>
             <pc:sldMk cId="1402944920" sldId="274"/>
@@ -9254,6 +9296,402 @@
             <ac:spMk id="3" creationId="{781BF53E-5015-A899-3DF5-F13019EDA93D}"/>
           </ac:spMkLst>
         </pc:spChg>
+      </pc:sldChg>
+      <pc:sldChg chg="addSp delSp modSp new mod modClrScheme chgLayout">
+        <pc:chgData name="Weifeng Xu" userId="e7aed605-a3dd-4d5a-a692-a87037af107b" providerId="ADAL" clId="{A8585D3D-BBB5-49ED-BAF1-BD44A9B37397}" dt="2023-01-22T22:10:16.759" v="1576" actId="20577"/>
+        <pc:sldMkLst>
+          <pc:docMk/>
+          <pc:sldMk cId="1034356353" sldId="276"/>
+        </pc:sldMkLst>
+        <pc:spChg chg="del mod ord">
+          <ac:chgData name="Weifeng Xu" userId="e7aed605-a3dd-4d5a-a692-a87037af107b" providerId="ADAL" clId="{A8585D3D-BBB5-49ED-BAF1-BD44A9B37397}" dt="2023-01-22T22:08:51.084" v="1550" actId="700"/>
+          <ac:spMkLst>
+            <pc:docMk/>
+            <pc:sldMk cId="1034356353" sldId="276"/>
+            <ac:spMk id="2" creationId="{0C935EA4-69D5-E2EC-9A10-3F5FA3EFB775}"/>
+          </ac:spMkLst>
+        </pc:spChg>
+        <pc:spChg chg="del mod ord">
+          <ac:chgData name="Weifeng Xu" userId="e7aed605-a3dd-4d5a-a692-a87037af107b" providerId="ADAL" clId="{A8585D3D-BBB5-49ED-BAF1-BD44A9B37397}" dt="2023-01-22T22:08:51.084" v="1550" actId="700"/>
+          <ac:spMkLst>
+            <pc:docMk/>
+            <pc:sldMk cId="1034356353" sldId="276"/>
+            <ac:spMk id="3" creationId="{22206CC1-EB6A-7693-CE6E-3D7BAEDAFC0C}"/>
+          </ac:spMkLst>
+        </pc:spChg>
+        <pc:spChg chg="add mod ord">
+          <ac:chgData name="Weifeng Xu" userId="e7aed605-a3dd-4d5a-a692-a87037af107b" providerId="ADAL" clId="{A8585D3D-BBB5-49ED-BAF1-BD44A9B37397}" dt="2023-01-22T22:09:18.156" v="1571" actId="20577"/>
+          <ac:spMkLst>
+            <pc:docMk/>
+            <pc:sldMk cId="1034356353" sldId="276"/>
+            <ac:spMk id="4" creationId="{31A48972-6ECB-ECC1-AA14-D03414D99212}"/>
+          </ac:spMkLst>
+        </pc:spChg>
+        <pc:spChg chg="add mod ord">
+          <ac:chgData name="Weifeng Xu" userId="e7aed605-a3dd-4d5a-a692-a87037af107b" providerId="ADAL" clId="{A8585D3D-BBB5-49ED-BAF1-BD44A9B37397}" dt="2023-01-22T22:10:16.759" v="1576" actId="20577"/>
+          <ac:spMkLst>
+            <pc:docMk/>
+            <pc:sldMk cId="1034356353" sldId="276"/>
+            <ac:spMk id="5" creationId="{0AFA1967-7E41-8305-36A1-C741B0127E68}"/>
+          </ac:spMkLst>
+        </pc:spChg>
+      </pc:sldChg>
+      <pc:sldChg chg="addSp delSp new mod modClrScheme chgLayout">
+        <pc:chgData name="Weifeng Xu" userId="e7aed605-a3dd-4d5a-a692-a87037af107b" providerId="ADAL" clId="{A8585D3D-BBB5-49ED-BAF1-BD44A9B37397}" dt="2023-01-22T22:09:04.551" v="1560"/>
+        <pc:sldMkLst>
+          <pc:docMk/>
+          <pc:sldMk cId="2146548294" sldId="277"/>
+        </pc:sldMkLst>
+        <pc:spChg chg="del">
+          <ac:chgData name="Weifeng Xu" userId="e7aed605-a3dd-4d5a-a692-a87037af107b" providerId="ADAL" clId="{A8585D3D-BBB5-49ED-BAF1-BD44A9B37397}" dt="2023-01-22T22:09:03.060" v="1559" actId="700"/>
+          <ac:spMkLst>
+            <pc:docMk/>
+            <pc:sldMk cId="2146548294" sldId="277"/>
+            <ac:spMk id="2" creationId="{FB90A93B-E3D2-CCB6-7195-FC487EACE92E}"/>
+          </ac:spMkLst>
+        </pc:spChg>
+        <pc:spChg chg="del">
+          <ac:chgData name="Weifeng Xu" userId="e7aed605-a3dd-4d5a-a692-a87037af107b" providerId="ADAL" clId="{A8585D3D-BBB5-49ED-BAF1-BD44A9B37397}" dt="2023-01-22T22:09:03.060" v="1559" actId="700"/>
+          <ac:spMkLst>
+            <pc:docMk/>
+            <pc:sldMk cId="2146548294" sldId="277"/>
+            <ac:spMk id="3" creationId="{745EF4BE-0C37-69A9-FBDA-EE1006323559}"/>
+          </ac:spMkLst>
+        </pc:spChg>
+        <pc:picChg chg="add">
+          <ac:chgData name="Weifeng Xu" userId="e7aed605-a3dd-4d5a-a692-a87037af107b" providerId="ADAL" clId="{A8585D3D-BBB5-49ED-BAF1-BD44A9B37397}" dt="2023-01-22T22:09:04.551" v="1560"/>
+          <ac:picMkLst>
+            <pc:docMk/>
+            <pc:sldMk cId="2146548294" sldId="277"/>
+            <ac:picMk id="1026" creationId="{2612B53D-A79A-1C9B-7E05-CF16FDA07882}"/>
+          </ac:picMkLst>
+        </pc:picChg>
+      </pc:sldChg>
+      <pc:sldChg chg="addSp delSp modSp new del mod modNotesTx">
+        <pc:chgData name="Weifeng Xu" userId="e7aed605-a3dd-4d5a-a692-a87037af107b" providerId="ADAL" clId="{A8585D3D-BBB5-49ED-BAF1-BD44A9B37397}" dt="2023-01-24T01:28:42.865" v="1872" actId="47"/>
+        <pc:sldMkLst>
+          <pc:docMk/>
+          <pc:sldMk cId="2145542939" sldId="278"/>
+        </pc:sldMkLst>
+        <pc:spChg chg="add mod">
+          <ac:chgData name="Weifeng Xu" userId="e7aed605-a3dd-4d5a-a692-a87037af107b" providerId="ADAL" clId="{A8585D3D-BBB5-49ED-BAF1-BD44A9B37397}" dt="2023-01-22T22:17:01.991" v="1605" actId="1076"/>
+          <ac:spMkLst>
+            <pc:docMk/>
+            <pc:sldMk cId="2145542939" sldId="278"/>
+            <ac:spMk id="3" creationId="{17B02E9C-8C7F-4441-F2DE-81C515664F9F}"/>
+          </ac:spMkLst>
+        </pc:spChg>
+        <pc:spChg chg="add del mod">
+          <ac:chgData name="Weifeng Xu" userId="e7aed605-a3dd-4d5a-a692-a87037af107b" providerId="ADAL" clId="{A8585D3D-BBB5-49ED-BAF1-BD44A9B37397}" dt="2023-01-24T01:25:27.797" v="1871" actId="478"/>
+          <ac:spMkLst>
+            <pc:docMk/>
+            <pc:sldMk cId="2145542939" sldId="278"/>
+            <ac:spMk id="8" creationId="{6E5087F5-CE1C-989C-4B91-C2AAE9D25C8F}"/>
+          </ac:spMkLst>
+        </pc:spChg>
+        <pc:spChg chg="add mod">
+          <ac:chgData name="Weifeng Xu" userId="e7aed605-a3dd-4d5a-a692-a87037af107b" providerId="ADAL" clId="{A8585D3D-BBB5-49ED-BAF1-BD44A9B37397}" dt="2023-01-23T01:52:54.027" v="1616"/>
+          <ac:spMkLst>
+            <pc:docMk/>
+            <pc:sldMk cId="2145542939" sldId="278"/>
+            <ac:spMk id="10" creationId="{402DF54C-7931-D0F2-7DFE-6F19E2959F13}"/>
+          </ac:spMkLst>
+        </pc:spChg>
+        <pc:picChg chg="add mod">
+          <ac:chgData name="Weifeng Xu" userId="e7aed605-a3dd-4d5a-a692-a87037af107b" providerId="ADAL" clId="{A8585D3D-BBB5-49ED-BAF1-BD44A9B37397}" dt="2023-01-22T22:17:01.991" v="1605" actId="1076"/>
+          <ac:picMkLst>
+            <pc:docMk/>
+            <pc:sldMk cId="2145542939" sldId="278"/>
+            <ac:picMk id="5" creationId="{F8E487A2-8101-2505-52A2-C5EC3A2A4812}"/>
+          </ac:picMkLst>
+        </pc:picChg>
+        <pc:picChg chg="add del mod">
+          <ac:chgData name="Weifeng Xu" userId="e7aed605-a3dd-4d5a-a692-a87037af107b" providerId="ADAL" clId="{A8585D3D-BBB5-49ED-BAF1-BD44A9B37397}" dt="2023-01-24T01:25:27.797" v="1871" actId="478"/>
+          <ac:picMkLst>
+            <pc:docMk/>
+            <pc:sldMk cId="2145542939" sldId="278"/>
+            <ac:picMk id="7" creationId="{DB53ACFA-F41D-383A-CCB7-A59C60F8C58F}"/>
+          </ac:picMkLst>
+        </pc:picChg>
+        <pc:picChg chg="add mod">
+          <ac:chgData name="Weifeng Xu" userId="e7aed605-a3dd-4d5a-a692-a87037af107b" providerId="ADAL" clId="{A8585D3D-BBB5-49ED-BAF1-BD44A9B37397}" dt="2023-01-23T01:56:01.328" v="1620" actId="1076"/>
+          <ac:picMkLst>
+            <pc:docMk/>
+            <pc:sldMk cId="2145542939" sldId="278"/>
+            <ac:picMk id="2050" creationId="{D6F62A89-3C58-AD9D-D01E-E37E8571A9EB}"/>
+          </ac:picMkLst>
+        </pc:picChg>
+      </pc:sldChg>
+      <pc:sldChg chg="addSp modSp new mod">
+        <pc:chgData name="Weifeng Xu" userId="e7aed605-a3dd-4d5a-a692-a87037af107b" providerId="ADAL" clId="{A8585D3D-BBB5-49ED-BAF1-BD44A9B37397}" dt="2023-01-23T02:11:58.282" v="1660" actId="1076"/>
+        <pc:sldMkLst>
+          <pc:docMk/>
+          <pc:sldMk cId="3912599437" sldId="279"/>
+        </pc:sldMkLst>
+        <pc:spChg chg="add mod">
+          <ac:chgData name="Weifeng Xu" userId="e7aed605-a3dd-4d5a-a692-a87037af107b" providerId="ADAL" clId="{A8585D3D-BBB5-49ED-BAF1-BD44A9B37397}" dt="2023-01-23T02:11:58.282" v="1660" actId="1076"/>
+          <ac:spMkLst>
+            <pc:docMk/>
+            <pc:sldMk cId="3912599437" sldId="279"/>
+            <ac:spMk id="3" creationId="{8964F884-74FF-C484-8C11-E1360B800B3F}"/>
+          </ac:spMkLst>
+        </pc:spChg>
+        <pc:spChg chg="add mod">
+          <ac:chgData name="Weifeng Xu" userId="e7aed605-a3dd-4d5a-a692-a87037af107b" providerId="ADAL" clId="{A8585D3D-BBB5-49ED-BAF1-BD44A9B37397}" dt="2023-01-23T02:11:58.282" v="1660" actId="1076"/>
+          <ac:spMkLst>
+            <pc:docMk/>
+            <pc:sldMk cId="3912599437" sldId="279"/>
+            <ac:spMk id="7" creationId="{98DD7E51-B99E-CFBF-C0E8-ACFC63B854BD}"/>
+          </ac:spMkLst>
+        </pc:spChg>
+        <pc:spChg chg="add mod">
+          <ac:chgData name="Weifeng Xu" userId="e7aed605-a3dd-4d5a-a692-a87037af107b" providerId="ADAL" clId="{A8585D3D-BBB5-49ED-BAF1-BD44A9B37397}" dt="2023-01-23T02:11:58.282" v="1660" actId="1076"/>
+          <ac:spMkLst>
+            <pc:docMk/>
+            <pc:sldMk cId="3912599437" sldId="279"/>
+            <ac:spMk id="8" creationId="{DD970FEB-F75D-20DA-4339-8C799D058BE2}"/>
+          </ac:spMkLst>
+        </pc:spChg>
+        <pc:picChg chg="add mod">
+          <ac:chgData name="Weifeng Xu" userId="e7aed605-a3dd-4d5a-a692-a87037af107b" providerId="ADAL" clId="{A8585D3D-BBB5-49ED-BAF1-BD44A9B37397}" dt="2023-01-23T02:11:58.282" v="1660" actId="1076"/>
+          <ac:picMkLst>
+            <pc:docMk/>
+            <pc:sldMk cId="3912599437" sldId="279"/>
+            <ac:picMk id="5" creationId="{E0D00852-C107-25BF-D7CA-898A6F092C78}"/>
+          </ac:picMkLst>
+        </pc:picChg>
+        <pc:cxnChg chg="add mod">
+          <ac:chgData name="Weifeng Xu" userId="e7aed605-a3dd-4d5a-a692-a87037af107b" providerId="ADAL" clId="{A8585D3D-BBB5-49ED-BAF1-BD44A9B37397}" dt="2023-01-23T02:11:58.282" v="1660" actId="1076"/>
+          <ac:cxnSpMkLst>
+            <pc:docMk/>
+            <pc:sldMk cId="3912599437" sldId="279"/>
+            <ac:cxnSpMk id="10" creationId="{E8161131-E849-6D41-4B3D-7CB4C9233376}"/>
+          </ac:cxnSpMkLst>
+        </pc:cxnChg>
+      </pc:sldChg>
+      <pc:sldChg chg="addSp modSp new mod">
+        <pc:chgData name="Weifeng Xu" userId="e7aed605-a3dd-4d5a-a692-a87037af107b" providerId="ADAL" clId="{A8585D3D-BBB5-49ED-BAF1-BD44A9B37397}" dt="2023-01-23T02:22:19.355" v="1755" actId="1076"/>
+        <pc:sldMkLst>
+          <pc:docMk/>
+          <pc:sldMk cId="1497295409" sldId="280"/>
+        </pc:sldMkLst>
+        <pc:spChg chg="add mod">
+          <ac:chgData name="Weifeng Xu" userId="e7aed605-a3dd-4d5a-a692-a87037af107b" providerId="ADAL" clId="{A8585D3D-BBB5-49ED-BAF1-BD44A9B37397}" dt="2023-01-23T02:22:19.355" v="1755" actId="1076"/>
+          <ac:spMkLst>
+            <pc:docMk/>
+            <pc:sldMk cId="1497295409" sldId="280"/>
+            <ac:spMk id="5" creationId="{755A5B43-0954-077E-EB83-DC42B5675273}"/>
+          </ac:spMkLst>
+        </pc:spChg>
+        <pc:picChg chg="add">
+          <ac:chgData name="Weifeng Xu" userId="e7aed605-a3dd-4d5a-a692-a87037af107b" providerId="ADAL" clId="{A8585D3D-BBB5-49ED-BAF1-BD44A9B37397}" dt="2023-01-23T02:16:14.709" v="1662" actId="22"/>
+          <ac:picMkLst>
+            <pc:docMk/>
+            <pc:sldMk cId="1497295409" sldId="280"/>
+            <ac:picMk id="3" creationId="{AD1B618A-FBDF-AB73-A679-BC06CE247A4A}"/>
+          </ac:picMkLst>
+        </pc:picChg>
+      </pc:sldChg>
+      <pc:sldChg chg="addSp modSp new mod">
+        <pc:chgData name="Weifeng Xu" userId="e7aed605-a3dd-4d5a-a692-a87037af107b" providerId="ADAL" clId="{A8585D3D-BBB5-49ED-BAF1-BD44A9B37397}" dt="2023-01-23T02:41:49.970" v="1778" actId="207"/>
+        <pc:sldMkLst>
+          <pc:docMk/>
+          <pc:sldMk cId="2970851014" sldId="281"/>
+        </pc:sldMkLst>
+        <pc:spChg chg="add mod">
+          <ac:chgData name="Weifeng Xu" userId="e7aed605-a3dd-4d5a-a692-a87037af107b" providerId="ADAL" clId="{A8585D3D-BBB5-49ED-BAF1-BD44A9B37397}" dt="2023-01-23T02:41:49.970" v="1778" actId="207"/>
+          <ac:spMkLst>
+            <pc:docMk/>
+            <pc:sldMk cId="2970851014" sldId="281"/>
+            <ac:spMk id="7" creationId="{66D05E85-2743-223F-D987-4644C884C98B}"/>
+          </ac:spMkLst>
+        </pc:spChg>
+        <pc:picChg chg="add mod">
+          <ac:chgData name="Weifeng Xu" userId="e7aed605-a3dd-4d5a-a692-a87037af107b" providerId="ADAL" clId="{A8585D3D-BBB5-49ED-BAF1-BD44A9B37397}" dt="2023-01-23T02:37:28.203" v="1761" actId="1076"/>
+          <ac:picMkLst>
+            <pc:docMk/>
+            <pc:sldMk cId="2970851014" sldId="281"/>
+            <ac:picMk id="3" creationId="{FC4D7DEE-D262-8919-5C91-3070998B6A83}"/>
+          </ac:picMkLst>
+        </pc:picChg>
+        <pc:picChg chg="add mod">
+          <ac:chgData name="Weifeng Xu" userId="e7aed605-a3dd-4d5a-a692-a87037af107b" providerId="ADAL" clId="{A8585D3D-BBB5-49ED-BAF1-BD44A9B37397}" dt="2023-01-23T02:37:36.212" v="1762" actId="1076"/>
+          <ac:picMkLst>
+            <pc:docMk/>
+            <pc:sldMk cId="2970851014" sldId="281"/>
+            <ac:picMk id="5" creationId="{A795B884-63A1-3C9F-62ED-BB2BCEFC2E68}"/>
+          </ac:picMkLst>
+        </pc:picChg>
+      </pc:sldChg>
+      <pc:sldChg chg="addSp delSp modSp new mod">
+        <pc:chgData name="Weifeng Xu" userId="e7aed605-a3dd-4d5a-a692-a87037af107b" providerId="ADAL" clId="{A8585D3D-BBB5-49ED-BAF1-BD44A9B37397}" dt="2023-01-23T02:51:47.491" v="1815" actId="1076"/>
+        <pc:sldMkLst>
+          <pc:docMk/>
+          <pc:sldMk cId="3945441786" sldId="282"/>
+        </pc:sldMkLst>
+        <pc:spChg chg="add mod">
+          <ac:chgData name="Weifeng Xu" userId="e7aed605-a3dd-4d5a-a692-a87037af107b" providerId="ADAL" clId="{A8585D3D-BBB5-49ED-BAF1-BD44A9B37397}" dt="2023-01-23T02:50:52.224" v="1791" actId="1076"/>
+          <ac:spMkLst>
+            <pc:docMk/>
+            <pc:sldMk cId="3945441786" sldId="282"/>
+            <ac:spMk id="7" creationId="{B01FE742-9EBC-1B44-D281-B4ABB8AD535A}"/>
+          </ac:spMkLst>
+        </pc:spChg>
+        <pc:spChg chg="add mod">
+          <ac:chgData name="Weifeng Xu" userId="e7aed605-a3dd-4d5a-a692-a87037af107b" providerId="ADAL" clId="{A8585D3D-BBB5-49ED-BAF1-BD44A9B37397}" dt="2023-01-23T02:51:45.040" v="1814" actId="207"/>
+          <ac:spMkLst>
+            <pc:docMk/>
+            <pc:sldMk cId="3945441786" sldId="282"/>
+            <ac:spMk id="9" creationId="{AE103956-E587-28D5-0AE8-31BB0F181DBA}"/>
+          </ac:spMkLst>
+        </pc:spChg>
+        <pc:picChg chg="add del mod">
+          <ac:chgData name="Weifeng Xu" userId="e7aed605-a3dd-4d5a-a692-a87037af107b" providerId="ADAL" clId="{A8585D3D-BBB5-49ED-BAF1-BD44A9B37397}" dt="2023-01-23T02:50:01.987" v="1783" actId="22"/>
+          <ac:picMkLst>
+            <pc:docMk/>
+            <pc:sldMk cId="3945441786" sldId="282"/>
+            <ac:picMk id="3" creationId="{05EC9930-B3C4-1B98-52A5-8ED8DA8F00CA}"/>
+          </ac:picMkLst>
+        </pc:picChg>
+        <pc:picChg chg="add mod">
+          <ac:chgData name="Weifeng Xu" userId="e7aed605-a3dd-4d5a-a692-a87037af107b" providerId="ADAL" clId="{A8585D3D-BBB5-49ED-BAF1-BD44A9B37397}" dt="2023-01-23T02:51:47.491" v="1815" actId="1076"/>
+          <ac:picMkLst>
+            <pc:docMk/>
+            <pc:sldMk cId="3945441786" sldId="282"/>
+            <ac:picMk id="5" creationId="{806B49C9-6A93-B1F6-6F24-7E3B3E1AB15F}"/>
+          </ac:picMkLst>
+        </pc:picChg>
+      </pc:sldChg>
+      <pc:sldChg chg="addSp modSp new mod">
+        <pc:chgData name="Weifeng Xu" userId="e7aed605-a3dd-4d5a-a692-a87037af107b" providerId="ADAL" clId="{A8585D3D-BBB5-49ED-BAF1-BD44A9B37397}" dt="2023-01-23T03:07:32.147" v="1841" actId="20577"/>
+        <pc:sldMkLst>
+          <pc:docMk/>
+          <pc:sldMk cId="3578714583" sldId="283"/>
+        </pc:sldMkLst>
+        <pc:spChg chg="add mod">
+          <ac:chgData name="Weifeng Xu" userId="e7aed605-a3dd-4d5a-a692-a87037af107b" providerId="ADAL" clId="{A8585D3D-BBB5-49ED-BAF1-BD44A9B37397}" dt="2023-01-23T03:07:32.147" v="1841" actId="20577"/>
+          <ac:spMkLst>
+            <pc:docMk/>
+            <pc:sldMk cId="3578714583" sldId="283"/>
+            <ac:spMk id="4" creationId="{49D3E0BE-77F9-D472-F1AA-4602D47D0461}"/>
+          </ac:spMkLst>
+        </pc:spChg>
+        <pc:picChg chg="add mod">
+          <ac:chgData name="Weifeng Xu" userId="e7aed605-a3dd-4d5a-a692-a87037af107b" providerId="ADAL" clId="{A8585D3D-BBB5-49ED-BAF1-BD44A9B37397}" dt="2023-01-23T03:06:35.826" v="1819" actId="1076"/>
+          <ac:picMkLst>
+            <pc:docMk/>
+            <pc:sldMk cId="3578714583" sldId="283"/>
+            <ac:picMk id="3" creationId="{0C0209AD-4C9F-AD82-DDDB-1A4CB3348F4A}"/>
+          </ac:picMkLst>
+        </pc:picChg>
+      </pc:sldChg>
+      <pc:sldChg chg="addSp delSp modSp new mod">
+        <pc:chgData name="Weifeng Xu" userId="e7aed605-a3dd-4d5a-a692-a87037af107b" providerId="ADAL" clId="{A8585D3D-BBB5-49ED-BAF1-BD44A9B37397}" dt="2023-01-23T03:33:31.452" v="1867" actId="20577"/>
+        <pc:sldMkLst>
+          <pc:docMk/>
+          <pc:sldMk cId="2275057761" sldId="284"/>
+        </pc:sldMkLst>
+        <pc:spChg chg="add mod">
+          <ac:chgData name="Weifeng Xu" userId="e7aed605-a3dd-4d5a-a692-a87037af107b" providerId="ADAL" clId="{A8585D3D-BBB5-49ED-BAF1-BD44A9B37397}" dt="2023-01-23T03:33:31.452" v="1867" actId="20577"/>
+          <ac:spMkLst>
+            <pc:docMk/>
+            <pc:sldMk cId="2275057761" sldId="284"/>
+            <ac:spMk id="9" creationId="{9E29DF4C-C5AB-5B08-82BC-B55C0690CB97}"/>
+          </ac:spMkLst>
+        </pc:spChg>
+        <pc:picChg chg="add del mod">
+          <ac:chgData name="Weifeng Xu" userId="e7aed605-a3dd-4d5a-a692-a87037af107b" providerId="ADAL" clId="{A8585D3D-BBB5-49ED-BAF1-BD44A9B37397}" dt="2023-01-23T03:22:03.042" v="1848" actId="478"/>
+          <ac:picMkLst>
+            <pc:docMk/>
+            <pc:sldMk cId="2275057761" sldId="284"/>
+            <ac:picMk id="3" creationId="{4BB75399-B998-5DD8-DC73-32AE58D6CF3F}"/>
+          </ac:picMkLst>
+        </pc:picChg>
+        <pc:picChg chg="add mod">
+          <ac:chgData name="Weifeng Xu" userId="e7aed605-a3dd-4d5a-a692-a87037af107b" providerId="ADAL" clId="{A8585D3D-BBB5-49ED-BAF1-BD44A9B37397}" dt="2023-01-23T03:22:28.671" v="1850" actId="1076"/>
+          <ac:picMkLst>
+            <pc:docMk/>
+            <pc:sldMk cId="2275057761" sldId="284"/>
+            <ac:picMk id="5" creationId="{7495EED0-4772-8A84-F6B4-7E2B774EEA41}"/>
+          </ac:picMkLst>
+        </pc:picChg>
+        <pc:picChg chg="add mod">
+          <ac:chgData name="Weifeng Xu" userId="e7aed605-a3dd-4d5a-a692-a87037af107b" providerId="ADAL" clId="{A8585D3D-BBB5-49ED-BAF1-BD44A9B37397}" dt="2023-01-23T03:23:10.975" v="1853" actId="1076"/>
+          <ac:picMkLst>
+            <pc:docMk/>
+            <pc:sldMk cId="2275057761" sldId="284"/>
+            <ac:picMk id="7" creationId="{B4667798-BCE1-CF90-DCB9-F2E02F5E18BA}"/>
+          </ac:picMkLst>
+        </pc:picChg>
+      </pc:sldChg>
+      <pc:sldChg chg="new del">
+        <pc:chgData name="Weifeng Xu" userId="e7aed605-a3dd-4d5a-a692-a87037af107b" providerId="ADAL" clId="{A8585D3D-BBB5-49ED-BAF1-BD44A9B37397}" dt="2023-01-23T03:12:35.494" v="1843" actId="47"/>
+        <pc:sldMkLst>
+          <pc:docMk/>
+          <pc:sldMk cId="3044093121" sldId="284"/>
+        </pc:sldMkLst>
+      </pc:sldChg>
+      <pc:sldChg chg="addSp modSp new mod">
+        <pc:chgData name="Weifeng Xu" userId="e7aed605-a3dd-4d5a-a692-a87037af107b" providerId="ADAL" clId="{A8585D3D-BBB5-49ED-BAF1-BD44A9B37397}" dt="2023-01-24T01:56:17.920" v="1957" actId="14100"/>
+        <pc:sldMkLst>
+          <pc:docMk/>
+          <pc:sldMk cId="3304301021" sldId="285"/>
+        </pc:sldMkLst>
+        <pc:spChg chg="add mod">
+          <ac:chgData name="Weifeng Xu" userId="e7aed605-a3dd-4d5a-a692-a87037af107b" providerId="ADAL" clId="{A8585D3D-BBB5-49ED-BAF1-BD44A9B37397}" dt="2023-01-24T01:33:10.089" v="1924" actId="108"/>
+          <ac:spMkLst>
+            <pc:docMk/>
+            <pc:sldMk cId="3304301021" sldId="285"/>
+            <ac:spMk id="4" creationId="{178B0461-317A-2FDE-BA30-67A868BE3119}"/>
+          </ac:spMkLst>
+        </pc:spChg>
+        <pc:spChg chg="add mod">
+          <ac:chgData name="Weifeng Xu" userId="e7aed605-a3dd-4d5a-a692-a87037af107b" providerId="ADAL" clId="{A8585D3D-BBB5-49ED-BAF1-BD44A9B37397}" dt="2023-01-24T01:32:43.352" v="1915" actId="2711"/>
+          <ac:spMkLst>
+            <pc:docMk/>
+            <pc:sldMk cId="3304301021" sldId="285"/>
+            <ac:spMk id="6" creationId="{E3AF53AD-4951-3029-1F0B-3B8E620325E7}"/>
+          </ac:spMkLst>
+        </pc:spChg>
+        <pc:spChg chg="add mod">
+          <ac:chgData name="Weifeng Xu" userId="e7aed605-a3dd-4d5a-a692-a87037af107b" providerId="ADAL" clId="{A8585D3D-BBB5-49ED-BAF1-BD44A9B37397}" dt="2023-01-24T01:55:55.372" v="1955" actId="14100"/>
+          <ac:spMkLst>
+            <pc:docMk/>
+            <pc:sldMk cId="3304301021" sldId="285"/>
+            <ac:spMk id="11" creationId="{4D06D30D-7434-F433-9C95-F3B4021F265B}"/>
+          </ac:spMkLst>
+        </pc:spChg>
+        <pc:picChg chg="add mod">
+          <ac:chgData name="Weifeng Xu" userId="e7aed605-a3dd-4d5a-a692-a87037af107b" providerId="ADAL" clId="{A8585D3D-BBB5-49ED-BAF1-BD44A9B37397}" dt="2023-01-24T01:55:41.857" v="1950" actId="1076"/>
+          <ac:picMkLst>
+            <pc:docMk/>
+            <pc:sldMk cId="3304301021" sldId="285"/>
+            <ac:picMk id="3" creationId="{8468F116-2563-B97E-0B0D-95D3733C3337}"/>
+          </ac:picMkLst>
+        </pc:picChg>
+        <pc:cxnChg chg="add mod">
+          <ac:chgData name="Weifeng Xu" userId="e7aed605-a3dd-4d5a-a692-a87037af107b" providerId="ADAL" clId="{A8585D3D-BBB5-49ED-BAF1-BD44A9B37397}" dt="2023-01-24T01:33:04.542" v="1923" actId="14100"/>
+          <ac:cxnSpMkLst>
+            <pc:docMk/>
+            <pc:sldMk cId="3304301021" sldId="285"/>
+            <ac:cxnSpMk id="8" creationId="{2A9B2646-4FD4-8118-15C2-EAAF71331F68}"/>
+          </ac:cxnSpMkLst>
+        </pc:cxnChg>
+        <pc:cxnChg chg="add mod">
+          <ac:chgData name="Weifeng Xu" userId="e7aed605-a3dd-4d5a-a692-a87037af107b" providerId="ADAL" clId="{A8585D3D-BBB5-49ED-BAF1-BD44A9B37397}" dt="2023-01-24T01:56:17.920" v="1957" actId="14100"/>
+          <ac:cxnSpMkLst>
+            <pc:docMk/>
+            <pc:sldMk cId="3304301021" sldId="285"/>
+            <ac:cxnSpMk id="13" creationId="{C32C462A-B988-4934-E83F-D01BCE990477}"/>
+          </ac:cxnSpMkLst>
+        </pc:cxnChg>
+      </pc:sldChg>
+      <pc:sldChg chg="add">
+        <pc:chgData name="Weifeng Xu" userId="e7aed605-a3dd-4d5a-a692-a87037af107b" providerId="ADAL" clId="{A8585D3D-BBB5-49ED-BAF1-BD44A9B37397}" dt="2023-01-24T01:25:18.150" v="1870"/>
+        <pc:sldMkLst>
+          <pc:docMk/>
+          <pc:sldMk cId="273989082" sldId="286"/>
+        </pc:sldMkLst>
       </pc:sldChg>
     </pc:docChg>
   </pc:docChgLst>
@@ -12835,7 +13273,7 @@
           <a:p>
             <a:fld id="{EE41F6E3-57F9-402E-BDBA-5B2DE11C8530}" type="datetimeFigureOut">
               <a:rPr lang="en-US" smtClean="0"/>
-              <a:t>8/4/2022</a:t>
+              <a:t>1/23/2023</a:t>
             </a:fld>
             <a:endParaRPr lang="en-US"/>
           </a:p>
@@ -13232,6 +13670,93 @@
           <a:p>
             <a:r>
               <a:rPr lang="en-US" dirty="0"/>
+              <a:t>https://itsfoss.com/content/images/wordpress/2021/12/LGP-30-early-computer-1956.jpg</a:t>
+            </a:r>
+          </a:p>
+        </p:txBody>
+      </p:sp>
+      <p:sp>
+        <p:nvSpPr>
+          <p:cNvPr id="4" name="Slide Number Placeholder 3"/>
+          <p:cNvSpPr>
+            <a:spLocks noGrp="1"/>
+          </p:cNvSpPr>
+          <p:nvPr>
+            <p:ph type="sldNum" sz="quarter" idx="5"/>
+          </p:nvPr>
+        </p:nvSpPr>
+        <p:spPr/>
+        <p:txBody>
+          <a:bodyPr/>
+          <a:lstStyle/>
+          <a:p>
+            <a:fld id="{DDBF98C7-164A-4723-84F0-B1E4B080DDEC}" type="slidenum">
+              <a:rPr lang="en-US" smtClean="0"/>
+              <a:t>5</a:t>
+            </a:fld>
+            <a:endParaRPr lang="en-US"/>
+          </a:p>
+        </p:txBody>
+      </p:sp>
+    </p:spTree>
+    <p:extLst>
+      <p:ext uri="{BB962C8B-B14F-4D97-AF65-F5344CB8AC3E}">
+        <p14:creationId xmlns:p14="http://schemas.microsoft.com/office/powerpoint/2010/main" val="356181318"/>
+      </p:ext>
+    </p:extLst>
+  </p:cSld>
+  <p:clrMapOvr>
+    <a:masterClrMapping/>
+  </p:clrMapOvr>
+</p:notes>
+</file>
+
+<file path=ppt/notesSlides/notesSlide3.xml><?xml version="1.0" encoding="utf-8"?>
+<p:notes xmlns:a="http://schemas.openxmlformats.org/drawingml/2006/main" xmlns:r="http://schemas.openxmlformats.org/officeDocument/2006/relationships" xmlns:p="http://schemas.openxmlformats.org/presentationml/2006/main">
+  <p:cSld>
+    <p:spTree>
+      <p:nvGrpSpPr>
+        <p:cNvPr id="1" name=""/>
+        <p:cNvGrpSpPr/>
+        <p:nvPr/>
+      </p:nvGrpSpPr>
+      <p:grpSpPr>
+        <a:xfrm>
+          <a:off x="0" y="0"/>
+          <a:ext cx="0" cy="0"/>
+          <a:chOff x="0" y="0"/>
+          <a:chExt cx="0" cy="0"/>
+        </a:xfrm>
+      </p:grpSpPr>
+      <p:sp>
+        <p:nvSpPr>
+          <p:cNvPr id="2" name="Slide Image Placeholder 1"/>
+          <p:cNvSpPr>
+            <a:spLocks noGrp="1" noRot="1" noChangeAspect="1"/>
+          </p:cNvSpPr>
+          <p:nvPr>
+            <p:ph type="sldImg"/>
+          </p:nvPr>
+        </p:nvSpPr>
+        <p:spPr/>
+      </p:sp>
+      <p:sp>
+        <p:nvSpPr>
+          <p:cNvPr id="3" name="Notes Placeholder 2"/>
+          <p:cNvSpPr>
+            <a:spLocks noGrp="1"/>
+          </p:cNvSpPr>
+          <p:nvPr>
+            <p:ph type="body" idx="1"/>
+          </p:nvPr>
+        </p:nvSpPr>
+        <p:spPr/>
+        <p:txBody>
+          <a:bodyPr/>
+          <a:lstStyle/>
+          <a:p>
+            <a:r>
+              <a:rPr lang="en-US" dirty="0"/>
               <a:t>netstat -</a:t>
             </a:r>
             <a:r>
@@ -13262,7 +13787,7 @@
           <a:p>
             <a:fld id="{DDBF98C7-164A-4723-84F0-B1E4B080DDEC}" type="slidenum">
               <a:rPr lang="en-US" smtClean="0"/>
-              <a:t>8</a:t>
+              <a:t>18</a:t>
             </a:fld>
             <a:endParaRPr lang="en-US"/>
           </a:p>
@@ -13281,7 +13806,7 @@
 </p:notes>
 </file>
 
-<file path=ppt/notesSlides/notesSlide3.xml><?xml version="1.0" encoding="utf-8"?>
+<file path=ppt/notesSlides/notesSlide4.xml><?xml version="1.0" encoding="utf-8"?>
 <p:notes xmlns:a="http://schemas.openxmlformats.org/drawingml/2006/main" xmlns:r="http://schemas.openxmlformats.org/officeDocument/2006/relationships" xmlns:p="http://schemas.openxmlformats.org/presentationml/2006/main">
   <p:cSld>
     <p:spTree>
@@ -13346,7 +13871,7 @@
           <a:p>
             <a:fld id="{DDBF98C7-164A-4723-84F0-B1E4B080DDEC}" type="slidenum">
               <a:rPr lang="en-US" smtClean="0"/>
-              <a:t>10</a:t>
+              <a:t>20</a:t>
             </a:fld>
             <a:endParaRPr lang="en-US"/>
           </a:p>
@@ -13365,7 +13890,7 @@
 </p:notes>
 </file>
 
-<file path=ppt/notesSlides/notesSlide4.xml><?xml version="1.0" encoding="utf-8"?>
+<file path=ppt/notesSlides/notesSlide5.xml><?xml version="1.0" encoding="utf-8"?>
 <p:notes xmlns:a="http://schemas.openxmlformats.org/drawingml/2006/main" xmlns:r="http://schemas.openxmlformats.org/officeDocument/2006/relationships" xmlns:p="http://schemas.openxmlformats.org/presentationml/2006/main">
   <p:cSld>
     <p:spTree>
@@ -13433,7 +13958,7 @@
           <a:p>
             <a:fld id="{DDBF98C7-164A-4723-84F0-B1E4B080DDEC}" type="slidenum">
               <a:rPr lang="en-US" smtClean="0"/>
-              <a:t>14</a:t>
+              <a:t>24</a:t>
             </a:fld>
             <a:endParaRPr lang="en-US"/>
           </a:p>
@@ -13452,7 +13977,7 @@
 </p:notes>
 </file>
 
-<file path=ppt/notesSlides/notesSlide5.xml><?xml version="1.0" encoding="utf-8"?>
+<file path=ppt/notesSlides/notesSlide6.xml><?xml version="1.0" encoding="utf-8"?>
 <p:notes xmlns:a="http://schemas.openxmlformats.org/drawingml/2006/main" xmlns:r="http://schemas.openxmlformats.org/officeDocument/2006/relationships" xmlns:p="http://schemas.openxmlformats.org/presentationml/2006/main">
   <p:cSld>
     <p:spTree>
@@ -13528,7 +14053,7 @@
           <a:p>
             <a:fld id="{DDBF98C7-164A-4723-84F0-B1E4B080DDEC}" type="slidenum">
               <a:rPr lang="en-US" smtClean="0"/>
-              <a:t>15</a:t>
+              <a:t>25</a:t>
             </a:fld>
             <a:endParaRPr lang="en-US"/>
           </a:p>
@@ -13547,7 +14072,7 @@
 </p:notes>
 </file>
 
-<file path=ppt/notesSlides/notesSlide6.xml><?xml version="1.0" encoding="utf-8"?>
+<file path=ppt/notesSlides/notesSlide7.xml><?xml version="1.0" encoding="utf-8"?>
 <p:notes xmlns:a="http://schemas.openxmlformats.org/drawingml/2006/main" xmlns:r="http://schemas.openxmlformats.org/officeDocument/2006/relationships" xmlns:p="http://schemas.openxmlformats.org/presentationml/2006/main">
   <p:cSld>
     <p:spTree>
@@ -13612,7 +14137,7 @@
           <a:p>
             <a:fld id="{DDBF98C7-164A-4723-84F0-B1E4B080DDEC}" type="slidenum">
               <a:rPr lang="en-US" smtClean="0"/>
-              <a:t>16</a:t>
+              <a:t>26</a:t>
             </a:fld>
             <a:endParaRPr lang="en-US"/>
           </a:p>
@@ -13760,7 +14285,7 @@
           <a:p>
             <a:fld id="{4263717A-E3C1-4BED-ABE0-B7069385E023}" type="datetimeFigureOut">
               <a:rPr lang="en-US" smtClean="0"/>
-              <a:t>8/4/2022</a:t>
+              <a:t>1/23/2023</a:t>
             </a:fld>
             <a:endParaRPr lang="en-US"/>
           </a:p>
@@ -13933,7 +14458,7 @@
           <a:p>
             <a:fld id="{4263717A-E3C1-4BED-ABE0-B7069385E023}" type="datetimeFigureOut">
               <a:rPr lang="en-US" smtClean="0"/>
-              <a:t>8/4/2022</a:t>
+              <a:t>1/23/2023</a:t>
             </a:fld>
             <a:endParaRPr lang="en-US"/>
           </a:p>
@@ -14111,7 +14636,7 @@
           <a:p>
             <a:fld id="{4263717A-E3C1-4BED-ABE0-B7069385E023}" type="datetimeFigureOut">
               <a:rPr lang="en-US" smtClean="0"/>
-              <a:t>8/4/2022</a:t>
+              <a:t>1/23/2023</a:t>
             </a:fld>
             <a:endParaRPr lang="en-US"/>
           </a:p>
@@ -14279,7 +14804,7 @@
           <a:p>
             <a:fld id="{4263717A-E3C1-4BED-ABE0-B7069385E023}" type="datetimeFigureOut">
               <a:rPr lang="en-US" smtClean="0"/>
-              <a:t>8/4/2022</a:t>
+              <a:t>1/23/2023</a:t>
             </a:fld>
             <a:endParaRPr lang="en-US"/>
           </a:p>
@@ -14524,7 +15049,7 @@
           <a:p>
             <a:fld id="{4263717A-E3C1-4BED-ABE0-B7069385E023}" type="datetimeFigureOut">
               <a:rPr lang="en-US" smtClean="0"/>
-              <a:t>8/4/2022</a:t>
+              <a:t>1/23/2023</a:t>
             </a:fld>
             <a:endParaRPr lang="en-US"/>
           </a:p>
@@ -14753,7 +15278,7 @@
           <a:p>
             <a:fld id="{4263717A-E3C1-4BED-ABE0-B7069385E023}" type="datetimeFigureOut">
               <a:rPr lang="en-US" smtClean="0"/>
-              <a:t>8/4/2022</a:t>
+              <a:t>1/23/2023</a:t>
             </a:fld>
             <a:endParaRPr lang="en-US"/>
           </a:p>
@@ -15117,7 +15642,7 @@
           <a:p>
             <a:fld id="{4263717A-E3C1-4BED-ABE0-B7069385E023}" type="datetimeFigureOut">
               <a:rPr lang="en-US" smtClean="0"/>
-              <a:t>8/4/2022</a:t>
+              <a:t>1/23/2023</a:t>
             </a:fld>
             <a:endParaRPr lang="en-US"/>
           </a:p>
@@ -15234,7 +15759,7 @@
           <a:p>
             <a:fld id="{4263717A-E3C1-4BED-ABE0-B7069385E023}" type="datetimeFigureOut">
               <a:rPr lang="en-US" smtClean="0"/>
-              <a:t>8/4/2022</a:t>
+              <a:t>1/23/2023</a:t>
             </a:fld>
             <a:endParaRPr lang="en-US"/>
           </a:p>
@@ -15329,7 +15854,7 @@
           <a:p>
             <a:fld id="{4263717A-E3C1-4BED-ABE0-B7069385E023}" type="datetimeFigureOut">
               <a:rPr lang="en-US" smtClean="0"/>
-              <a:t>8/4/2022</a:t>
+              <a:t>1/23/2023</a:t>
             </a:fld>
             <a:endParaRPr lang="en-US"/>
           </a:p>
@@ -15604,7 +16129,7 @@
           <a:p>
             <a:fld id="{4263717A-E3C1-4BED-ABE0-B7069385E023}" type="datetimeFigureOut">
               <a:rPr lang="en-US" smtClean="0"/>
-              <a:t>8/4/2022</a:t>
+              <a:t>1/23/2023</a:t>
             </a:fld>
             <a:endParaRPr lang="en-US"/>
           </a:p>
@@ -15856,7 +16381,7 @@
           <a:p>
             <a:fld id="{4263717A-E3C1-4BED-ABE0-B7069385E023}" type="datetimeFigureOut">
               <a:rPr lang="en-US" smtClean="0"/>
-              <a:t>8/4/2022</a:t>
+              <a:t>1/23/2023</a:t>
             </a:fld>
             <a:endParaRPr lang="en-US"/>
           </a:p>
@@ -16067,7 +16592,7 @@
           <a:p>
             <a:fld id="{4263717A-E3C1-4BED-ABE0-B7069385E023}" type="datetimeFigureOut">
               <a:rPr lang="en-US" smtClean="0"/>
-              <a:t>8/4/2022</a:t>
+              <a:t>1/23/2023</a:t>
             </a:fld>
             <a:endParaRPr lang="en-US"/>
           </a:p>
@@ -16723,6 +17248,1668 @@
       </p:grpSpPr>
       <p:pic>
         <p:nvPicPr>
+          <p:cNvPr id="3" name="Picture 2">
+            <a:extLst>
+              <a:ext uri="{FF2B5EF4-FFF2-40B4-BE49-F238E27FC236}">
+                <a16:creationId xmlns:a16="http://schemas.microsoft.com/office/drawing/2014/main" id="{0C0209AD-4C9F-AD82-DDDB-1A4CB3348F4A}"/>
+              </a:ext>
+            </a:extLst>
+          </p:cNvPr>
+          <p:cNvPicPr>
+            <a:picLocks noChangeAspect="1"/>
+          </p:cNvPicPr>
+          <p:nvPr/>
+        </p:nvPicPr>
+        <p:blipFill>
+          <a:blip r:embed="rId2"/>
+          <a:stretch>
+            <a:fillRect/>
+          </a:stretch>
+        </p:blipFill>
+        <p:spPr>
+          <a:xfrm>
+            <a:off x="1902062" y="2113567"/>
+            <a:ext cx="4991533" cy="1425063"/>
+          </a:xfrm>
+          <a:prstGeom prst="rect">
+            <a:avLst/>
+          </a:prstGeom>
+        </p:spPr>
+      </p:pic>
+      <p:sp>
+        <p:nvSpPr>
+          <p:cNvPr id="4" name="TextBox 3">
+            <a:extLst>
+              <a:ext uri="{FF2B5EF4-FFF2-40B4-BE49-F238E27FC236}">
+                <a16:creationId xmlns:a16="http://schemas.microsoft.com/office/drawing/2014/main" id="{49D3E0BE-77F9-D472-F1AA-4602D47D0461}"/>
+              </a:ext>
+            </a:extLst>
+          </p:cNvPr>
+          <p:cNvSpPr txBox="1"/>
+          <p:nvPr/>
+        </p:nvSpPr>
+        <p:spPr>
+          <a:xfrm>
+            <a:off x="1902062" y="1744235"/>
+            <a:ext cx="2733606" cy="369332"/>
+          </a:xfrm>
+          <a:prstGeom prst="rect">
+            <a:avLst/>
+          </a:prstGeom>
+          <a:solidFill>
+            <a:schemeClr val="accent4"/>
+          </a:solidFill>
+        </p:spPr>
+        <p:txBody>
+          <a:bodyPr wrap="square">
+            <a:spAutoFit/>
+          </a:bodyPr>
+          <a:lstStyle/>
+          <a:p>
+            <a:r>
+              <a:rPr lang="en-US" dirty="0"/>
+              <a:t>Kill a process</a:t>
+            </a:r>
+          </a:p>
+        </p:txBody>
+      </p:sp>
+    </p:spTree>
+    <p:extLst>
+      <p:ext uri="{BB962C8B-B14F-4D97-AF65-F5344CB8AC3E}">
+        <p14:creationId xmlns:p14="http://schemas.microsoft.com/office/powerpoint/2010/main" val="3578714583"/>
+      </p:ext>
+    </p:extLst>
+  </p:cSld>
+  <p:clrMapOvr>
+    <a:masterClrMapping/>
+  </p:clrMapOvr>
+</p:sld>
+</file>
+
+<file path=ppt/slides/slide11.xml><?xml version="1.0" encoding="utf-8"?>
+<p:sld xmlns:a="http://schemas.openxmlformats.org/drawingml/2006/main" xmlns:r="http://schemas.openxmlformats.org/officeDocument/2006/relationships" xmlns:p="http://schemas.openxmlformats.org/presentationml/2006/main">
+  <p:cSld>
+    <p:spTree>
+      <p:nvGrpSpPr>
+        <p:cNvPr id="1" name=""/>
+        <p:cNvGrpSpPr/>
+        <p:nvPr/>
+      </p:nvGrpSpPr>
+      <p:grpSpPr>
+        <a:xfrm>
+          <a:off x="0" y="0"/>
+          <a:ext cx="0" cy="0"/>
+          <a:chOff x="0" y="0"/>
+          <a:chExt cx="0" cy="0"/>
+        </a:xfrm>
+      </p:grpSpPr>
+      <p:pic>
+        <p:nvPicPr>
+          <p:cNvPr id="5" name="Picture 4">
+            <a:extLst>
+              <a:ext uri="{FF2B5EF4-FFF2-40B4-BE49-F238E27FC236}">
+                <a16:creationId xmlns:a16="http://schemas.microsoft.com/office/drawing/2014/main" id="{7495EED0-4772-8A84-F6B4-7E2B774EEA41}"/>
+              </a:ext>
+            </a:extLst>
+          </p:cNvPr>
+          <p:cNvPicPr>
+            <a:picLocks noChangeAspect="1"/>
+          </p:cNvPicPr>
+          <p:nvPr/>
+        </p:nvPicPr>
+        <p:blipFill>
+          <a:blip r:embed="rId2"/>
+          <a:stretch>
+            <a:fillRect/>
+          </a:stretch>
+        </p:blipFill>
+        <p:spPr>
+          <a:xfrm>
+            <a:off x="678752" y="556011"/>
+            <a:ext cx="6111770" cy="5745978"/>
+          </a:xfrm>
+          <a:prstGeom prst="rect">
+            <a:avLst/>
+          </a:prstGeom>
+        </p:spPr>
+      </p:pic>
+      <p:pic>
+        <p:nvPicPr>
+          <p:cNvPr id="7" name="Picture 6">
+            <a:extLst>
+              <a:ext uri="{FF2B5EF4-FFF2-40B4-BE49-F238E27FC236}">
+                <a16:creationId xmlns:a16="http://schemas.microsoft.com/office/drawing/2014/main" id="{B4667798-BCE1-CF90-DCB9-F2E02F5E18BA}"/>
+              </a:ext>
+            </a:extLst>
+          </p:cNvPr>
+          <p:cNvPicPr>
+            <a:picLocks noChangeAspect="1"/>
+          </p:cNvPicPr>
+          <p:nvPr/>
+        </p:nvPicPr>
+        <p:blipFill>
+          <a:blip r:embed="rId3"/>
+          <a:stretch>
+            <a:fillRect/>
+          </a:stretch>
+        </p:blipFill>
+        <p:spPr>
+          <a:xfrm>
+            <a:off x="6642826" y="2144774"/>
+            <a:ext cx="5136325" cy="3955123"/>
+          </a:xfrm>
+          <a:prstGeom prst="rect">
+            <a:avLst/>
+          </a:prstGeom>
+        </p:spPr>
+      </p:pic>
+      <p:sp>
+        <p:nvSpPr>
+          <p:cNvPr id="9" name="TextBox 8">
+            <a:extLst>
+              <a:ext uri="{FF2B5EF4-FFF2-40B4-BE49-F238E27FC236}">
+                <a16:creationId xmlns:a16="http://schemas.microsoft.com/office/drawing/2014/main" id="{9E29DF4C-C5AB-5B08-82BC-B55C0690CB97}"/>
+              </a:ext>
+            </a:extLst>
+          </p:cNvPr>
+          <p:cNvSpPr txBox="1"/>
+          <p:nvPr/>
+        </p:nvSpPr>
+        <p:spPr>
+          <a:xfrm>
+            <a:off x="5813677" y="888728"/>
+            <a:ext cx="6169688" cy="923330"/>
+          </a:xfrm>
+          <a:prstGeom prst="rect">
+            <a:avLst/>
+          </a:prstGeom>
+          <a:solidFill>
+            <a:schemeClr val="accent4">
+              <a:lumMod val="20000"/>
+              <a:lumOff val="80000"/>
+            </a:schemeClr>
+          </a:solidFill>
+        </p:spPr>
+        <p:txBody>
+          <a:bodyPr wrap="square">
+            <a:spAutoFit/>
+          </a:bodyPr>
+          <a:lstStyle/>
+          <a:p>
+            <a:r>
+              <a:rPr lang="en-US" b="1" i="0" dirty="0" err="1">
+                <a:solidFill>
+                  <a:srgbClr val="FF0000"/>
+                </a:solidFill>
+                <a:effectLst/>
+                <a:latin typeface="OCRB" panose="020B0609020202020204" pitchFamily="49" charset="0"/>
+              </a:rPr>
+              <a:t>ps</a:t>
+            </a:r>
+            <a:r>
+              <a:rPr lang="en-US" b="1" i="0" dirty="0">
+                <a:solidFill>
+                  <a:srgbClr val="FF0000"/>
+                </a:solidFill>
+                <a:effectLst/>
+                <a:latin typeface="OCRB" panose="020B0609020202020204" pitchFamily="49" charset="0"/>
+              </a:rPr>
+              <a:t> aux/-aux </a:t>
+            </a:r>
+            <a:r>
+              <a:rPr lang="en-GB" dirty="0"/>
+              <a:t>displays the most amount of information a user usually needs to understand the current state of their system’s running processes</a:t>
+            </a:r>
+            <a:endParaRPr lang="en-US" dirty="0"/>
+          </a:p>
+        </p:txBody>
+      </p:sp>
+    </p:spTree>
+    <p:extLst>
+      <p:ext uri="{BB962C8B-B14F-4D97-AF65-F5344CB8AC3E}">
+        <p14:creationId xmlns:p14="http://schemas.microsoft.com/office/powerpoint/2010/main" val="2275057761"/>
+      </p:ext>
+    </p:extLst>
+  </p:cSld>
+  <p:clrMapOvr>
+    <a:masterClrMapping/>
+  </p:clrMapOvr>
+</p:sld>
+</file>
+
+<file path=ppt/slides/slide12.xml><?xml version="1.0" encoding="utf-8"?>
+<p:sld xmlns:a="http://schemas.openxmlformats.org/drawingml/2006/main" xmlns:r="http://schemas.openxmlformats.org/officeDocument/2006/relationships" xmlns:p="http://schemas.openxmlformats.org/presentationml/2006/main">
+  <p:cSld>
+    <p:spTree>
+      <p:nvGrpSpPr>
+        <p:cNvPr id="1" name=""/>
+        <p:cNvGrpSpPr/>
+        <p:nvPr/>
+      </p:nvGrpSpPr>
+      <p:grpSpPr>
+        <a:xfrm>
+          <a:off x="0" y="0"/>
+          <a:ext cx="0" cy="0"/>
+          <a:chOff x="0" y="0"/>
+          <a:chExt cx="0" cy="0"/>
+        </a:xfrm>
+      </p:grpSpPr>
+      <p:pic>
+        <p:nvPicPr>
+          <p:cNvPr id="3" name="Picture 2">
+            <a:extLst>
+              <a:ext uri="{FF2B5EF4-FFF2-40B4-BE49-F238E27FC236}">
+                <a16:creationId xmlns:a16="http://schemas.microsoft.com/office/drawing/2014/main" id="{8468F116-2563-B97E-0B0D-95D3733C3337}"/>
+              </a:ext>
+            </a:extLst>
+          </p:cNvPr>
+          <p:cNvPicPr>
+            <a:picLocks noChangeAspect="1"/>
+          </p:cNvPicPr>
+          <p:nvPr/>
+        </p:nvPicPr>
+        <p:blipFill>
+          <a:blip r:embed="rId2"/>
+          <a:stretch>
+            <a:fillRect/>
+          </a:stretch>
+        </p:blipFill>
+        <p:spPr>
+          <a:xfrm>
+            <a:off x="1302604" y="1661007"/>
+            <a:ext cx="9586791" cy="3535986"/>
+          </a:xfrm>
+          <a:prstGeom prst="rect">
+            <a:avLst/>
+          </a:prstGeom>
+        </p:spPr>
+      </p:pic>
+      <p:sp>
+        <p:nvSpPr>
+          <p:cNvPr id="4" name="TextBox 3">
+            <a:extLst>
+              <a:ext uri="{FF2B5EF4-FFF2-40B4-BE49-F238E27FC236}">
+                <a16:creationId xmlns:a16="http://schemas.microsoft.com/office/drawing/2014/main" id="{178B0461-317A-2FDE-BA30-67A868BE3119}"/>
+              </a:ext>
+            </a:extLst>
+          </p:cNvPr>
+          <p:cNvSpPr txBox="1"/>
+          <p:nvPr/>
+        </p:nvSpPr>
+        <p:spPr>
+          <a:xfrm>
+            <a:off x="2107531" y="781870"/>
+            <a:ext cx="2183732" cy="738664"/>
+          </a:xfrm>
+          <a:prstGeom prst="rect">
+            <a:avLst/>
+          </a:prstGeom>
+          <a:noFill/>
+        </p:spPr>
+        <p:txBody>
+          <a:bodyPr wrap="square">
+            <a:spAutoFit/>
+          </a:bodyPr>
+          <a:lstStyle/>
+          <a:p>
+            <a:r>
+              <a:rPr lang="en-US" dirty="0">
+                <a:solidFill>
+                  <a:srgbClr val="5E6065"/>
+                </a:solidFill>
+                <a:latin typeface="Source Sans Pro" panose="020B0503030403020204" pitchFamily="34" charset="0"/>
+              </a:rPr>
+              <a:t>UNIX-style option</a:t>
+            </a:r>
+            <a:r>
+              <a:rPr lang="en-US" dirty="0"/>
+              <a:t>: MUST has </a:t>
+            </a:r>
+            <a:r>
+              <a:rPr lang="en-US" sz="2400" b="1" dirty="0">
+                <a:solidFill>
+                  <a:srgbClr val="FF0000"/>
+                </a:solidFill>
+              </a:rPr>
+              <a:t>- </a:t>
+            </a:r>
+            <a:endParaRPr lang="en-US" b="1" dirty="0">
+              <a:solidFill>
+                <a:srgbClr val="FF0000"/>
+              </a:solidFill>
+            </a:endParaRPr>
+          </a:p>
+        </p:txBody>
+      </p:sp>
+      <p:sp>
+        <p:nvSpPr>
+          <p:cNvPr id="6" name="TextBox 5">
+            <a:extLst>
+              <a:ext uri="{FF2B5EF4-FFF2-40B4-BE49-F238E27FC236}">
+                <a16:creationId xmlns:a16="http://schemas.microsoft.com/office/drawing/2014/main" id="{E3AF53AD-4951-3029-1F0B-3B8E620325E7}"/>
+              </a:ext>
+            </a:extLst>
+          </p:cNvPr>
+          <p:cNvSpPr txBox="1"/>
+          <p:nvPr/>
+        </p:nvSpPr>
+        <p:spPr>
+          <a:xfrm>
+            <a:off x="4717195" y="781870"/>
+            <a:ext cx="2926868" cy="646331"/>
+          </a:xfrm>
+          <a:prstGeom prst="rect">
+            <a:avLst/>
+          </a:prstGeom>
+          <a:noFill/>
+        </p:spPr>
+        <p:txBody>
+          <a:bodyPr wrap="square">
+            <a:spAutoFit/>
+          </a:bodyPr>
+          <a:lstStyle/>
+          <a:p>
+            <a:r>
+              <a:rPr lang="en-US" b="0" i="0" dirty="0">
+                <a:solidFill>
+                  <a:srgbClr val="5E6065"/>
+                </a:solidFill>
+                <a:effectLst/>
+                <a:latin typeface="Source Sans Pro" panose="020B0503030403020204" pitchFamily="34" charset="0"/>
+              </a:rPr>
+              <a:t>BSD-style options: </a:t>
+            </a:r>
+            <a:r>
+              <a:rPr lang="en-US" dirty="0" err="1">
+                <a:latin typeface="OCRB" panose="020B0609020202020204" pitchFamily="49" charset="0"/>
+              </a:rPr>
+              <a:t>ps</a:t>
+            </a:r>
+            <a:r>
+              <a:rPr lang="en-US" dirty="0">
+                <a:latin typeface="OCRB" panose="020B0609020202020204" pitchFamily="49" charset="0"/>
+              </a:rPr>
+              <a:t> aux </a:t>
+            </a:r>
+            <a:r>
+              <a:rPr lang="en-US" dirty="0"/>
+              <a:t>without </a:t>
+            </a:r>
+            <a:r>
+              <a:rPr lang="en-US" sz="1800" b="1" dirty="0">
+                <a:solidFill>
+                  <a:srgbClr val="FF0000"/>
+                </a:solidFill>
+              </a:rPr>
+              <a:t>-</a:t>
+            </a:r>
+            <a:r>
+              <a:rPr lang="en-US" dirty="0"/>
+              <a:t>  </a:t>
+            </a:r>
+          </a:p>
+        </p:txBody>
+      </p:sp>
+      <p:cxnSp>
+        <p:nvCxnSpPr>
+          <p:cNvPr id="8" name="Straight Arrow Connector 7">
+            <a:extLst>
+              <a:ext uri="{FF2B5EF4-FFF2-40B4-BE49-F238E27FC236}">
+                <a16:creationId xmlns:a16="http://schemas.microsoft.com/office/drawing/2014/main" id="{2A9B2646-4FD4-8118-15C2-EAAF71331F68}"/>
+              </a:ext>
+            </a:extLst>
+          </p:cNvPr>
+          <p:cNvCxnSpPr>
+            <a:cxnSpLocks/>
+            <a:endCxn id="4" idx="2"/>
+          </p:cNvCxnSpPr>
+          <p:nvPr/>
+        </p:nvCxnSpPr>
+        <p:spPr>
+          <a:xfrm flipH="1" flipV="1">
+            <a:off x="3199397" y="1520534"/>
+            <a:ext cx="482266" cy="492750"/>
+          </a:xfrm>
+          <a:prstGeom prst="straightConnector1">
+            <a:avLst/>
+          </a:prstGeom>
+          <a:ln>
+            <a:tailEnd type="triangle"/>
+          </a:ln>
+        </p:spPr>
+        <p:style>
+          <a:lnRef idx="1">
+            <a:schemeClr val="accent2"/>
+          </a:lnRef>
+          <a:fillRef idx="0">
+            <a:schemeClr val="accent2"/>
+          </a:fillRef>
+          <a:effectRef idx="0">
+            <a:schemeClr val="accent2"/>
+          </a:effectRef>
+          <a:fontRef idx="minor">
+            <a:schemeClr val="tx1"/>
+          </a:fontRef>
+        </p:style>
+      </p:cxnSp>
+      <p:sp>
+        <p:nvSpPr>
+          <p:cNvPr id="11" name="TextBox 10">
+            <a:extLst>
+              <a:ext uri="{FF2B5EF4-FFF2-40B4-BE49-F238E27FC236}">
+                <a16:creationId xmlns:a16="http://schemas.microsoft.com/office/drawing/2014/main" id="{4D06D30D-7434-F433-9C95-F3B4021F265B}"/>
+              </a:ext>
+            </a:extLst>
+          </p:cNvPr>
+          <p:cNvSpPr txBox="1"/>
+          <p:nvPr/>
+        </p:nvSpPr>
+        <p:spPr>
+          <a:xfrm>
+            <a:off x="5540543" y="5706798"/>
+            <a:ext cx="1774658" cy="369332"/>
+          </a:xfrm>
+          <a:prstGeom prst="rect">
+            <a:avLst/>
+          </a:prstGeom>
+          <a:solidFill>
+            <a:schemeClr val="accent4">
+              <a:lumMod val="20000"/>
+              <a:lumOff val="80000"/>
+            </a:schemeClr>
+          </a:solidFill>
+        </p:spPr>
+        <p:txBody>
+          <a:bodyPr wrap="square">
+            <a:spAutoFit/>
+          </a:bodyPr>
+          <a:lstStyle/>
+          <a:p>
+            <a:r>
+              <a:rPr lang="en-US" dirty="0"/>
+              <a:t>sate information </a:t>
+            </a:r>
+          </a:p>
+        </p:txBody>
+      </p:sp>
+      <p:cxnSp>
+        <p:nvCxnSpPr>
+          <p:cNvPr id="13" name="Straight Arrow Connector 12">
+            <a:extLst>
+              <a:ext uri="{FF2B5EF4-FFF2-40B4-BE49-F238E27FC236}">
+                <a16:creationId xmlns:a16="http://schemas.microsoft.com/office/drawing/2014/main" id="{C32C462A-B988-4934-E83F-D01BCE990477}"/>
+              </a:ext>
+            </a:extLst>
+          </p:cNvPr>
+          <p:cNvCxnSpPr>
+            <a:cxnSpLocks/>
+            <a:stCxn id="11" idx="0"/>
+            <a:endCxn id="3" idx="2"/>
+          </p:cNvCxnSpPr>
+          <p:nvPr/>
+        </p:nvCxnSpPr>
+        <p:spPr>
+          <a:xfrm flipH="1" flipV="1">
+            <a:off x="6096000" y="5196993"/>
+            <a:ext cx="331872" cy="509805"/>
+          </a:xfrm>
+          <a:prstGeom prst="straightConnector1">
+            <a:avLst/>
+          </a:prstGeom>
+          <a:ln>
+            <a:tailEnd type="triangle"/>
+          </a:ln>
+        </p:spPr>
+        <p:style>
+          <a:lnRef idx="1">
+            <a:schemeClr val="accent1"/>
+          </a:lnRef>
+          <a:fillRef idx="0">
+            <a:schemeClr val="accent1"/>
+          </a:fillRef>
+          <a:effectRef idx="0">
+            <a:schemeClr val="accent1"/>
+          </a:effectRef>
+          <a:fontRef idx="minor">
+            <a:schemeClr val="tx1"/>
+          </a:fontRef>
+        </p:style>
+      </p:cxnSp>
+    </p:spTree>
+    <p:extLst>
+      <p:ext uri="{BB962C8B-B14F-4D97-AF65-F5344CB8AC3E}">
+        <p14:creationId xmlns:p14="http://schemas.microsoft.com/office/powerpoint/2010/main" val="3304301021"/>
+      </p:ext>
+    </p:extLst>
+  </p:cSld>
+  <p:clrMapOvr>
+    <a:masterClrMapping/>
+  </p:clrMapOvr>
+</p:sld>
+</file>
+
+<file path=ppt/slides/slide13.xml><?xml version="1.0" encoding="utf-8"?>
+<p:sld xmlns:a="http://schemas.openxmlformats.org/drawingml/2006/main" xmlns:r="http://schemas.openxmlformats.org/officeDocument/2006/relationships" xmlns:p="http://schemas.openxmlformats.org/presentationml/2006/main">
+  <p:cSld>
+    <p:spTree>
+      <p:nvGrpSpPr>
+        <p:cNvPr id="1" name=""/>
+        <p:cNvGrpSpPr/>
+        <p:nvPr/>
+      </p:nvGrpSpPr>
+      <p:grpSpPr>
+        <a:xfrm>
+          <a:off x="0" y="0"/>
+          <a:ext cx="0" cy="0"/>
+          <a:chOff x="0" y="0"/>
+          <a:chExt cx="0" cy="0"/>
+        </a:xfrm>
+      </p:grpSpPr>
+      <p:sp>
+        <p:nvSpPr>
+          <p:cNvPr id="4" name="Title 3">
+            <a:extLst>
+              <a:ext uri="{FF2B5EF4-FFF2-40B4-BE49-F238E27FC236}">
+                <a16:creationId xmlns:a16="http://schemas.microsoft.com/office/drawing/2014/main" id="{F55C460F-56BB-A17B-9F04-1F9528C051B8}"/>
+              </a:ext>
+            </a:extLst>
+          </p:cNvPr>
+          <p:cNvSpPr>
+            <a:spLocks noGrp="1"/>
+          </p:cNvSpPr>
+          <p:nvPr>
+            <p:ph type="title"/>
+          </p:nvPr>
+        </p:nvSpPr>
+        <p:spPr/>
+        <p:txBody>
+          <a:bodyPr/>
+          <a:lstStyle/>
+          <a:p>
+            <a:r>
+              <a:rPr lang="en-GB" dirty="0" err="1"/>
+              <a:t>Analyze</a:t>
+            </a:r>
+            <a:r>
+              <a:rPr lang="en-GB" dirty="0"/>
+              <a:t> network ports used by </a:t>
+            </a:r>
+            <a:r>
+              <a:rPr lang="en-US" dirty="0"/>
+              <a:t>Morris Worm</a:t>
+            </a:r>
+          </a:p>
+        </p:txBody>
+      </p:sp>
+      <p:sp>
+        <p:nvSpPr>
+          <p:cNvPr id="5" name="Text Placeholder 4">
+            <a:extLst>
+              <a:ext uri="{FF2B5EF4-FFF2-40B4-BE49-F238E27FC236}">
+                <a16:creationId xmlns:a16="http://schemas.microsoft.com/office/drawing/2014/main" id="{BFF13C6C-45F4-C757-8B79-9A8E8D32D090}"/>
+              </a:ext>
+            </a:extLst>
+          </p:cNvPr>
+          <p:cNvSpPr>
+            <a:spLocks noGrp="1"/>
+          </p:cNvSpPr>
+          <p:nvPr>
+            <p:ph type="body" idx="1"/>
+          </p:nvPr>
+        </p:nvSpPr>
+        <p:spPr/>
+        <p:txBody>
+          <a:bodyPr/>
+          <a:lstStyle/>
+          <a:p>
+            <a:endParaRPr lang="en-US"/>
+          </a:p>
+        </p:txBody>
+      </p:sp>
+    </p:spTree>
+    <p:extLst>
+      <p:ext uri="{BB962C8B-B14F-4D97-AF65-F5344CB8AC3E}">
+        <p14:creationId xmlns:p14="http://schemas.microsoft.com/office/powerpoint/2010/main" val="1402944920"/>
+      </p:ext>
+    </p:extLst>
+  </p:cSld>
+  <p:clrMapOvr>
+    <a:masterClrMapping/>
+  </p:clrMapOvr>
+</p:sld>
+</file>
+
+<file path=ppt/slides/slide14.xml><?xml version="1.0" encoding="utf-8"?>
+<p:sld xmlns:a="http://schemas.openxmlformats.org/drawingml/2006/main" xmlns:r="http://schemas.openxmlformats.org/officeDocument/2006/relationships" xmlns:p="http://schemas.openxmlformats.org/presentationml/2006/main">
+  <p:cSld>
+    <p:spTree>
+      <p:nvGrpSpPr>
+        <p:cNvPr id="1" name=""/>
+        <p:cNvGrpSpPr/>
+        <p:nvPr/>
+      </p:nvGrpSpPr>
+      <p:grpSpPr>
+        <a:xfrm>
+          <a:off x="0" y="0"/>
+          <a:ext cx="0" cy="0"/>
+          <a:chOff x="0" y="0"/>
+          <a:chExt cx="0" cy="0"/>
+        </a:xfrm>
+      </p:grpSpPr>
+      <p:pic>
+        <p:nvPicPr>
+          <p:cNvPr id="3" name="Picture 2">
+            <a:extLst>
+              <a:ext uri="{FF2B5EF4-FFF2-40B4-BE49-F238E27FC236}">
+                <a16:creationId xmlns:a16="http://schemas.microsoft.com/office/drawing/2014/main" id="{2BC73066-5719-D6E0-F846-5BD60573DA5A}"/>
+              </a:ext>
+            </a:extLst>
+          </p:cNvPr>
+          <p:cNvPicPr>
+            <a:picLocks noChangeAspect="1"/>
+          </p:cNvPicPr>
+          <p:nvPr/>
+        </p:nvPicPr>
+        <p:blipFill>
+          <a:blip r:embed="rId2"/>
+          <a:stretch>
+            <a:fillRect/>
+          </a:stretch>
+        </p:blipFill>
+        <p:spPr>
+          <a:xfrm>
+            <a:off x="1206079" y="0"/>
+            <a:ext cx="9779841" cy="6858000"/>
+          </a:xfrm>
+          <a:prstGeom prst="rect">
+            <a:avLst/>
+          </a:prstGeom>
+        </p:spPr>
+      </p:pic>
+    </p:spTree>
+    <p:extLst>
+      <p:ext uri="{BB962C8B-B14F-4D97-AF65-F5344CB8AC3E}">
+        <p14:creationId xmlns:p14="http://schemas.microsoft.com/office/powerpoint/2010/main" val="4201276766"/>
+      </p:ext>
+    </p:extLst>
+  </p:cSld>
+  <p:clrMapOvr>
+    <a:masterClrMapping/>
+  </p:clrMapOvr>
+</p:sld>
+</file>
+
+<file path=ppt/slides/slide15.xml><?xml version="1.0" encoding="utf-8"?>
+<p:sld xmlns:a="http://schemas.openxmlformats.org/drawingml/2006/main" xmlns:r="http://schemas.openxmlformats.org/officeDocument/2006/relationships" xmlns:p="http://schemas.openxmlformats.org/presentationml/2006/main">
+  <p:cSld>
+    <p:spTree>
+      <p:nvGrpSpPr>
+        <p:cNvPr id="1" name=""/>
+        <p:cNvGrpSpPr/>
+        <p:nvPr/>
+      </p:nvGrpSpPr>
+      <p:grpSpPr>
+        <a:xfrm>
+          <a:off x="0" y="0"/>
+          <a:ext cx="0" cy="0"/>
+          <a:chOff x="0" y="0"/>
+          <a:chExt cx="0" cy="0"/>
+        </a:xfrm>
+      </p:grpSpPr>
+      <p:pic>
+        <p:nvPicPr>
+          <p:cNvPr id="3" name="Picture 2">
+            <a:extLst>
+              <a:ext uri="{FF2B5EF4-FFF2-40B4-BE49-F238E27FC236}">
+                <a16:creationId xmlns:a16="http://schemas.microsoft.com/office/drawing/2014/main" id="{16A695F2-870F-964C-2BD2-5BF2907DF762}"/>
+              </a:ext>
+            </a:extLst>
+          </p:cNvPr>
+          <p:cNvPicPr>
+            <a:picLocks noChangeAspect="1"/>
+          </p:cNvPicPr>
+          <p:nvPr/>
+        </p:nvPicPr>
+        <p:blipFill>
+          <a:blip r:embed="rId2"/>
+          <a:stretch>
+            <a:fillRect/>
+          </a:stretch>
+        </p:blipFill>
+        <p:spPr>
+          <a:xfrm>
+            <a:off x="1182193" y="355823"/>
+            <a:ext cx="7178662" cy="4861981"/>
+          </a:xfrm>
+          <a:prstGeom prst="rect">
+            <a:avLst/>
+          </a:prstGeom>
+        </p:spPr>
+      </p:pic>
+      <p:pic>
+        <p:nvPicPr>
+          <p:cNvPr id="5" name="Picture 4">
+            <a:extLst>
+              <a:ext uri="{FF2B5EF4-FFF2-40B4-BE49-F238E27FC236}">
+                <a16:creationId xmlns:a16="http://schemas.microsoft.com/office/drawing/2014/main" id="{D872A1EC-D070-33F0-4C0A-20430FA7F90A}"/>
+              </a:ext>
+            </a:extLst>
+          </p:cNvPr>
+          <p:cNvPicPr>
+            <a:picLocks noChangeAspect="1"/>
+          </p:cNvPicPr>
+          <p:nvPr/>
+        </p:nvPicPr>
+        <p:blipFill rotWithShape="1">
+          <a:blip r:embed="rId3"/>
+          <a:srcRect r="1977"/>
+          <a:stretch/>
+        </p:blipFill>
+        <p:spPr>
+          <a:xfrm>
+            <a:off x="1182194" y="5454071"/>
+            <a:ext cx="7178662" cy="1021168"/>
+          </a:xfrm>
+          <a:prstGeom prst="rect">
+            <a:avLst/>
+          </a:prstGeom>
+        </p:spPr>
+      </p:pic>
+      <p:sp>
+        <p:nvSpPr>
+          <p:cNvPr id="6" name="TextBox 5">
+            <a:extLst>
+              <a:ext uri="{FF2B5EF4-FFF2-40B4-BE49-F238E27FC236}">
+                <a16:creationId xmlns:a16="http://schemas.microsoft.com/office/drawing/2014/main" id="{A51C1D4B-D498-65AF-B6D7-0843007D004E}"/>
+              </a:ext>
+            </a:extLst>
+          </p:cNvPr>
+          <p:cNvSpPr txBox="1"/>
+          <p:nvPr/>
+        </p:nvSpPr>
+        <p:spPr>
+          <a:xfrm>
+            <a:off x="8963025" y="1685925"/>
+            <a:ext cx="1827231" cy="369332"/>
+          </a:xfrm>
+          <a:prstGeom prst="rect">
+            <a:avLst/>
+          </a:prstGeom>
+          <a:noFill/>
+        </p:spPr>
+        <p:txBody>
+          <a:bodyPr wrap="none" rtlCol="0">
+            <a:spAutoFit/>
+          </a:bodyPr>
+          <a:lstStyle/>
+          <a:p>
+            <a:r>
+              <a:rPr lang="en-US" dirty="0">
+                <a:latin typeface="Britannic Bold" panose="020B0903060703020204" pitchFamily="34" charset="0"/>
+              </a:rPr>
+              <a:t>worm.py </a:t>
+            </a:r>
+            <a:r>
+              <a:rPr lang="en-US" dirty="0"/>
+              <a:t>process</a:t>
+            </a:r>
+          </a:p>
+        </p:txBody>
+      </p:sp>
+      <p:sp>
+        <p:nvSpPr>
+          <p:cNvPr id="7" name="TextBox 6">
+            <a:extLst>
+              <a:ext uri="{FF2B5EF4-FFF2-40B4-BE49-F238E27FC236}">
+                <a16:creationId xmlns:a16="http://schemas.microsoft.com/office/drawing/2014/main" id="{F92868F1-C02F-4D62-9DA3-DE837B601586}"/>
+              </a:ext>
+            </a:extLst>
+          </p:cNvPr>
+          <p:cNvSpPr txBox="1"/>
+          <p:nvPr/>
+        </p:nvSpPr>
+        <p:spPr>
+          <a:xfrm>
+            <a:off x="8763000" y="5454071"/>
+            <a:ext cx="2197140" cy="369332"/>
+          </a:xfrm>
+          <a:prstGeom prst="rect">
+            <a:avLst/>
+          </a:prstGeom>
+          <a:noFill/>
+        </p:spPr>
+        <p:txBody>
+          <a:bodyPr wrap="none" rtlCol="0">
+            <a:spAutoFit/>
+          </a:bodyPr>
+          <a:lstStyle/>
+          <a:p>
+            <a:r>
+              <a:rPr lang="en-US" dirty="0"/>
+              <a:t>listening to port 9999</a:t>
+            </a:r>
+          </a:p>
+        </p:txBody>
+      </p:sp>
+      <p:sp>
+        <p:nvSpPr>
+          <p:cNvPr id="8" name="TextBox 7">
+            <a:extLst>
+              <a:ext uri="{FF2B5EF4-FFF2-40B4-BE49-F238E27FC236}">
+                <a16:creationId xmlns:a16="http://schemas.microsoft.com/office/drawing/2014/main" id="{82EAB93D-6235-E491-1766-A4C8E7C1ECDB}"/>
+              </a:ext>
+            </a:extLst>
+          </p:cNvPr>
+          <p:cNvSpPr txBox="1"/>
+          <p:nvPr/>
+        </p:nvSpPr>
+        <p:spPr>
+          <a:xfrm flipH="1">
+            <a:off x="1182193" y="0"/>
+            <a:ext cx="3109883" cy="369332"/>
+          </a:xfrm>
+          <a:prstGeom prst="rect">
+            <a:avLst/>
+          </a:prstGeom>
+          <a:solidFill>
+            <a:schemeClr val="accent4"/>
+          </a:solidFill>
+        </p:spPr>
+        <p:txBody>
+          <a:bodyPr wrap="square" rtlCol="0">
+            <a:spAutoFit/>
+          </a:bodyPr>
+          <a:lstStyle/>
+          <a:p>
+            <a:r>
+              <a:rPr lang="en-US" dirty="0"/>
+              <a:t>Check processes</a:t>
+            </a:r>
+          </a:p>
+        </p:txBody>
+      </p:sp>
+      <p:cxnSp>
+        <p:nvCxnSpPr>
+          <p:cNvPr id="4" name="Straight Arrow Connector 3">
+            <a:extLst>
+              <a:ext uri="{FF2B5EF4-FFF2-40B4-BE49-F238E27FC236}">
+                <a16:creationId xmlns:a16="http://schemas.microsoft.com/office/drawing/2014/main" id="{B09A4352-161F-A2B0-0AFF-0CB962704353}"/>
+              </a:ext>
+            </a:extLst>
+          </p:cNvPr>
+          <p:cNvCxnSpPr>
+            <a:stCxn id="6" idx="1"/>
+          </p:cNvCxnSpPr>
+          <p:nvPr/>
+        </p:nvCxnSpPr>
+        <p:spPr>
+          <a:xfrm flipH="1" flipV="1">
+            <a:off x="6978316" y="1868905"/>
+            <a:ext cx="1984709" cy="1686"/>
+          </a:xfrm>
+          <a:prstGeom prst="straightConnector1">
+            <a:avLst/>
+          </a:prstGeom>
+          <a:ln>
+            <a:tailEnd type="triangle"/>
+          </a:ln>
+        </p:spPr>
+        <p:style>
+          <a:lnRef idx="1">
+            <a:schemeClr val="accent2"/>
+          </a:lnRef>
+          <a:fillRef idx="0">
+            <a:schemeClr val="accent2"/>
+          </a:fillRef>
+          <a:effectRef idx="0">
+            <a:schemeClr val="accent2"/>
+          </a:effectRef>
+          <a:fontRef idx="minor">
+            <a:schemeClr val="tx1"/>
+          </a:fontRef>
+        </p:style>
+      </p:cxnSp>
+      <p:cxnSp>
+        <p:nvCxnSpPr>
+          <p:cNvPr id="10" name="Straight Arrow Connector 9">
+            <a:extLst>
+              <a:ext uri="{FF2B5EF4-FFF2-40B4-BE49-F238E27FC236}">
+                <a16:creationId xmlns:a16="http://schemas.microsoft.com/office/drawing/2014/main" id="{467E0FC3-4DD7-77E1-F1E2-9C904488D0AF}"/>
+              </a:ext>
+            </a:extLst>
+          </p:cNvPr>
+          <p:cNvCxnSpPr>
+            <a:stCxn id="7" idx="1"/>
+          </p:cNvCxnSpPr>
+          <p:nvPr/>
+        </p:nvCxnSpPr>
+        <p:spPr>
+          <a:xfrm flipH="1">
+            <a:off x="8360855" y="5638737"/>
+            <a:ext cx="402145" cy="80274"/>
+          </a:xfrm>
+          <a:prstGeom prst="straightConnector1">
+            <a:avLst/>
+          </a:prstGeom>
+          <a:ln>
+            <a:tailEnd type="triangle"/>
+          </a:ln>
+        </p:spPr>
+        <p:style>
+          <a:lnRef idx="1">
+            <a:schemeClr val="accent2"/>
+          </a:lnRef>
+          <a:fillRef idx="0">
+            <a:schemeClr val="accent2"/>
+          </a:fillRef>
+          <a:effectRef idx="0">
+            <a:schemeClr val="accent2"/>
+          </a:effectRef>
+          <a:fontRef idx="minor">
+            <a:schemeClr val="tx1"/>
+          </a:fontRef>
+        </p:style>
+      </p:cxnSp>
+      <p:sp>
+        <p:nvSpPr>
+          <p:cNvPr id="12" name="TextBox 11">
+            <a:extLst>
+              <a:ext uri="{FF2B5EF4-FFF2-40B4-BE49-F238E27FC236}">
+                <a16:creationId xmlns:a16="http://schemas.microsoft.com/office/drawing/2014/main" id="{DA2AB511-C45D-67EE-80FB-1F0C24AAE108}"/>
+              </a:ext>
+            </a:extLst>
+          </p:cNvPr>
+          <p:cNvSpPr txBox="1"/>
+          <p:nvPr/>
+        </p:nvSpPr>
+        <p:spPr>
+          <a:xfrm>
+            <a:off x="8763000" y="273444"/>
+            <a:ext cx="2985040" cy="1477328"/>
+          </a:xfrm>
+          <a:prstGeom prst="rect">
+            <a:avLst/>
+          </a:prstGeom>
+          <a:solidFill>
+            <a:schemeClr val="accent4">
+              <a:lumMod val="20000"/>
+              <a:lumOff val="80000"/>
+            </a:schemeClr>
+          </a:solidFill>
+        </p:spPr>
+        <p:txBody>
+          <a:bodyPr wrap="square">
+            <a:spAutoFit/>
+          </a:bodyPr>
+          <a:lstStyle/>
+          <a:p>
+            <a:r>
+              <a:rPr lang="en-GB" b="1" dirty="0">
+                <a:solidFill>
+                  <a:srgbClr val="FF0000"/>
+                </a:solidFill>
+                <a:latin typeface="OCRB" panose="020B0609020202020204" pitchFamily="49" charset="0"/>
+              </a:rPr>
+              <a:t>s</a:t>
+            </a:r>
+            <a:r>
+              <a:rPr lang="en-GB" dirty="0"/>
+              <a:t>: a session leader (i.e., the root process). </a:t>
+            </a:r>
+          </a:p>
+          <a:p>
+            <a:r>
+              <a:rPr lang="en-GB" b="1" dirty="0">
+                <a:solidFill>
+                  <a:srgbClr val="FF0000"/>
+                </a:solidFill>
+                <a:latin typeface="OCRB" panose="020B0609020202020204" pitchFamily="49" charset="0"/>
+              </a:rPr>
+              <a:t>S</a:t>
+            </a:r>
+            <a:r>
+              <a:rPr lang="en-GB" dirty="0"/>
+              <a:t>:  an interruptible sleep state, and is waiting for some event</a:t>
+            </a:r>
+            <a:endParaRPr lang="en-US" dirty="0"/>
+          </a:p>
+        </p:txBody>
+      </p:sp>
+      <p:cxnSp>
+        <p:nvCxnSpPr>
+          <p:cNvPr id="14" name="Straight Arrow Connector 13">
+            <a:extLst>
+              <a:ext uri="{FF2B5EF4-FFF2-40B4-BE49-F238E27FC236}">
+                <a16:creationId xmlns:a16="http://schemas.microsoft.com/office/drawing/2014/main" id="{0DEA2B36-11DD-1077-93D3-A2AB31297FD2}"/>
+              </a:ext>
+            </a:extLst>
+          </p:cNvPr>
+          <p:cNvCxnSpPr>
+            <a:cxnSpLocks/>
+            <a:stCxn id="12" idx="1"/>
+          </p:cNvCxnSpPr>
+          <p:nvPr/>
+        </p:nvCxnSpPr>
+        <p:spPr>
+          <a:xfrm flipH="1">
+            <a:off x="4788568" y="1012108"/>
+            <a:ext cx="3974432" cy="22489"/>
+          </a:xfrm>
+          <a:prstGeom prst="straightConnector1">
+            <a:avLst/>
+          </a:prstGeom>
+          <a:ln>
+            <a:tailEnd type="triangle"/>
+          </a:ln>
+        </p:spPr>
+        <p:style>
+          <a:lnRef idx="1">
+            <a:schemeClr val="accent2"/>
+          </a:lnRef>
+          <a:fillRef idx="0">
+            <a:schemeClr val="accent2"/>
+          </a:fillRef>
+          <a:effectRef idx="0">
+            <a:schemeClr val="accent2"/>
+          </a:effectRef>
+          <a:fontRef idx="minor">
+            <a:schemeClr val="tx1"/>
+          </a:fontRef>
+        </p:style>
+      </p:cxnSp>
+    </p:spTree>
+    <p:extLst>
+      <p:ext uri="{BB962C8B-B14F-4D97-AF65-F5344CB8AC3E}">
+        <p14:creationId xmlns:p14="http://schemas.microsoft.com/office/powerpoint/2010/main" val="2049237961"/>
+      </p:ext>
+    </p:extLst>
+  </p:cSld>
+  <p:clrMapOvr>
+    <a:masterClrMapping/>
+  </p:clrMapOvr>
+</p:sld>
+</file>
+
+<file path=ppt/slides/slide16.xml><?xml version="1.0" encoding="utf-8"?>
+<p:sld xmlns:a="http://schemas.openxmlformats.org/drawingml/2006/main" xmlns:r="http://schemas.openxmlformats.org/officeDocument/2006/relationships" xmlns:p="http://schemas.openxmlformats.org/presentationml/2006/main">
+  <p:cSld>
+    <p:spTree>
+      <p:nvGrpSpPr>
+        <p:cNvPr id="1" name=""/>
+        <p:cNvGrpSpPr/>
+        <p:nvPr/>
+      </p:nvGrpSpPr>
+      <p:grpSpPr>
+        <a:xfrm>
+          <a:off x="0" y="0"/>
+          <a:ext cx="0" cy="0"/>
+          <a:chOff x="0" y="0"/>
+          <a:chExt cx="0" cy="0"/>
+        </a:xfrm>
+      </p:grpSpPr>
+      <p:pic>
+        <p:nvPicPr>
+          <p:cNvPr id="3" name="Picture 2">
+            <a:extLst>
+              <a:ext uri="{FF2B5EF4-FFF2-40B4-BE49-F238E27FC236}">
+                <a16:creationId xmlns:a16="http://schemas.microsoft.com/office/drawing/2014/main" id="{7028B884-C865-B179-DB74-C783E486585C}"/>
+              </a:ext>
+            </a:extLst>
+          </p:cNvPr>
+          <p:cNvPicPr>
+            <a:picLocks noChangeAspect="1"/>
+          </p:cNvPicPr>
+          <p:nvPr/>
+        </p:nvPicPr>
+        <p:blipFill>
+          <a:blip r:embed="rId2"/>
+          <a:stretch>
+            <a:fillRect/>
+          </a:stretch>
+        </p:blipFill>
+        <p:spPr>
+          <a:xfrm>
+            <a:off x="1742708" y="700803"/>
+            <a:ext cx="8458933" cy="5456393"/>
+          </a:xfrm>
+          <a:prstGeom prst="rect">
+            <a:avLst/>
+          </a:prstGeom>
+        </p:spPr>
+      </p:pic>
+      <p:sp>
+        <p:nvSpPr>
+          <p:cNvPr id="4" name="TextBox 3">
+            <a:extLst>
+              <a:ext uri="{FF2B5EF4-FFF2-40B4-BE49-F238E27FC236}">
+                <a16:creationId xmlns:a16="http://schemas.microsoft.com/office/drawing/2014/main" id="{D93B7AA0-0F6A-8FFC-949A-DAB9F8B6E0C7}"/>
+              </a:ext>
+            </a:extLst>
+          </p:cNvPr>
+          <p:cNvSpPr txBox="1"/>
+          <p:nvPr/>
+        </p:nvSpPr>
+        <p:spPr>
+          <a:xfrm flipH="1">
+            <a:off x="1742708" y="331471"/>
+            <a:ext cx="3109883" cy="369332"/>
+          </a:xfrm>
+          <a:prstGeom prst="rect">
+            <a:avLst/>
+          </a:prstGeom>
+          <a:solidFill>
+            <a:schemeClr val="accent4"/>
+          </a:solidFill>
+        </p:spPr>
+        <p:txBody>
+          <a:bodyPr wrap="square" rtlCol="0">
+            <a:spAutoFit/>
+          </a:bodyPr>
+          <a:lstStyle/>
+          <a:p>
+            <a:r>
+              <a:rPr lang="en-US" dirty="0"/>
+              <a:t>Another machine</a:t>
+            </a:r>
+          </a:p>
+        </p:txBody>
+      </p:sp>
+    </p:spTree>
+    <p:extLst>
+      <p:ext uri="{BB962C8B-B14F-4D97-AF65-F5344CB8AC3E}">
+        <p14:creationId xmlns:p14="http://schemas.microsoft.com/office/powerpoint/2010/main" val="2839709660"/>
+      </p:ext>
+    </p:extLst>
+  </p:cSld>
+  <p:clrMapOvr>
+    <a:masterClrMapping/>
+  </p:clrMapOvr>
+</p:sld>
+</file>
+
+<file path=ppt/slides/slide17.xml><?xml version="1.0" encoding="utf-8"?>
+<p:sld xmlns:a="http://schemas.openxmlformats.org/drawingml/2006/main" xmlns:r="http://schemas.openxmlformats.org/officeDocument/2006/relationships" xmlns:p="http://schemas.openxmlformats.org/presentationml/2006/main">
+  <p:cSld>
+    <p:spTree>
+      <p:nvGrpSpPr>
+        <p:cNvPr id="1" name=""/>
+        <p:cNvGrpSpPr/>
+        <p:nvPr/>
+      </p:nvGrpSpPr>
+      <p:grpSpPr>
+        <a:xfrm>
+          <a:off x="0" y="0"/>
+          <a:ext cx="0" cy="0"/>
+          <a:chOff x="0" y="0"/>
+          <a:chExt cx="0" cy="0"/>
+        </a:xfrm>
+      </p:grpSpPr>
+      <p:sp>
+        <p:nvSpPr>
+          <p:cNvPr id="2" name="Title 1">
+            <a:extLst>
+              <a:ext uri="{FF2B5EF4-FFF2-40B4-BE49-F238E27FC236}">
+                <a16:creationId xmlns:a16="http://schemas.microsoft.com/office/drawing/2014/main" id="{DD76D4BB-914B-B91F-83B4-0A5794C6DDB6}"/>
+              </a:ext>
+            </a:extLst>
+          </p:cNvPr>
+          <p:cNvSpPr>
+            <a:spLocks noGrp="1"/>
+          </p:cNvSpPr>
+          <p:nvPr>
+            <p:ph type="title"/>
+          </p:nvPr>
+        </p:nvSpPr>
+        <p:spPr/>
+        <p:txBody>
+          <a:bodyPr/>
+          <a:lstStyle/>
+          <a:p>
+            <a:r>
+              <a:rPr lang="en-US" dirty="0"/>
+              <a:t>Analyze worm running processes</a:t>
+            </a:r>
+          </a:p>
+        </p:txBody>
+      </p:sp>
+      <p:sp>
+        <p:nvSpPr>
+          <p:cNvPr id="3" name="Text Placeholder 2">
+            <a:extLst>
+              <a:ext uri="{FF2B5EF4-FFF2-40B4-BE49-F238E27FC236}">
+                <a16:creationId xmlns:a16="http://schemas.microsoft.com/office/drawing/2014/main" id="{781BF53E-5015-A899-3DF5-F13019EDA93D}"/>
+              </a:ext>
+            </a:extLst>
+          </p:cNvPr>
+          <p:cNvSpPr>
+            <a:spLocks noGrp="1"/>
+          </p:cNvSpPr>
+          <p:nvPr>
+            <p:ph type="body" idx="1"/>
+          </p:nvPr>
+        </p:nvSpPr>
+        <p:spPr/>
+        <p:txBody>
+          <a:bodyPr/>
+          <a:lstStyle/>
+          <a:p>
+            <a:endParaRPr lang="en-US"/>
+          </a:p>
+        </p:txBody>
+      </p:sp>
+    </p:spTree>
+    <p:extLst>
+      <p:ext uri="{BB962C8B-B14F-4D97-AF65-F5344CB8AC3E}">
+        <p14:creationId xmlns:p14="http://schemas.microsoft.com/office/powerpoint/2010/main" val="1232812502"/>
+      </p:ext>
+    </p:extLst>
+  </p:cSld>
+  <p:clrMapOvr>
+    <a:masterClrMapping/>
+  </p:clrMapOvr>
+</p:sld>
+</file>
+
+<file path=ppt/slides/slide18.xml><?xml version="1.0" encoding="utf-8"?>
+<p:sld xmlns:a="http://schemas.openxmlformats.org/drawingml/2006/main" xmlns:r="http://schemas.openxmlformats.org/officeDocument/2006/relationships" xmlns:p="http://schemas.openxmlformats.org/presentationml/2006/main">
+  <p:cSld>
+    <p:spTree>
+      <p:nvGrpSpPr>
+        <p:cNvPr id="1" name=""/>
+        <p:cNvGrpSpPr/>
+        <p:nvPr/>
+      </p:nvGrpSpPr>
+      <p:grpSpPr>
+        <a:xfrm>
+          <a:off x="0" y="0"/>
+          <a:ext cx="0" cy="0"/>
+          <a:chOff x="0" y="0"/>
+          <a:chExt cx="0" cy="0"/>
+        </a:xfrm>
+      </p:grpSpPr>
+      <p:pic>
+        <p:nvPicPr>
+          <p:cNvPr id="5" name="Picture 4">
+            <a:extLst>
+              <a:ext uri="{FF2B5EF4-FFF2-40B4-BE49-F238E27FC236}">
+                <a16:creationId xmlns:a16="http://schemas.microsoft.com/office/drawing/2014/main" id="{3AD7618D-B25E-0AB6-2FD9-593A2131DB8F}"/>
+              </a:ext>
+            </a:extLst>
+          </p:cNvPr>
+          <p:cNvPicPr>
+            <a:picLocks noChangeAspect="1"/>
+          </p:cNvPicPr>
+          <p:nvPr/>
+        </p:nvPicPr>
+        <p:blipFill>
+          <a:blip r:embed="rId3"/>
+          <a:stretch>
+            <a:fillRect/>
+          </a:stretch>
+        </p:blipFill>
+        <p:spPr>
+          <a:xfrm>
+            <a:off x="964812" y="1704589"/>
+            <a:ext cx="9869955" cy="2610236"/>
+          </a:xfrm>
+          <a:prstGeom prst="rect">
+            <a:avLst/>
+          </a:prstGeom>
+        </p:spPr>
+      </p:pic>
+      <p:sp>
+        <p:nvSpPr>
+          <p:cNvPr id="6" name="TextBox 5">
+            <a:extLst>
+              <a:ext uri="{FF2B5EF4-FFF2-40B4-BE49-F238E27FC236}">
+                <a16:creationId xmlns:a16="http://schemas.microsoft.com/office/drawing/2014/main" id="{AD893021-AB7C-4932-D1C1-B10AB7CE776F}"/>
+              </a:ext>
+            </a:extLst>
+          </p:cNvPr>
+          <p:cNvSpPr txBox="1"/>
+          <p:nvPr/>
+        </p:nvSpPr>
+        <p:spPr>
+          <a:xfrm>
+            <a:off x="7694474" y="4644189"/>
+            <a:ext cx="2748935" cy="646331"/>
+          </a:xfrm>
+          <a:prstGeom prst="rect">
+            <a:avLst/>
+          </a:prstGeom>
+          <a:noFill/>
+        </p:spPr>
+        <p:txBody>
+          <a:bodyPr wrap="square" rtlCol="0">
+            <a:spAutoFit/>
+          </a:bodyPr>
+          <a:lstStyle/>
+          <a:p>
+            <a:r>
+              <a:rPr lang="en-US" dirty="0" err="1">
+                <a:latin typeface="Britannic Bold" panose="020B0903060703020204" pitchFamily="34" charset="0"/>
+              </a:rPr>
+              <a:t>nc</a:t>
+            </a:r>
+            <a:r>
+              <a:rPr lang="en-US" dirty="0">
+                <a:latin typeface="Britannic Bold" panose="020B0903060703020204" pitchFamily="34" charset="0"/>
+              </a:rPr>
+              <a:t> </a:t>
+            </a:r>
+            <a:r>
+              <a:rPr lang="en-US" dirty="0"/>
+              <a:t>command</a:t>
+            </a:r>
+          </a:p>
+          <a:p>
+            <a:pPr marL="285750" indent="-285750">
+              <a:buFont typeface="Arial" panose="020B0604020202020204" pitchFamily="34" charset="0"/>
+              <a:buChar char="•"/>
+            </a:pPr>
+            <a:r>
+              <a:rPr lang="en-US" dirty="0"/>
+              <a:t>listen to port 9999</a:t>
+            </a:r>
+          </a:p>
+        </p:txBody>
+      </p:sp>
+      <p:cxnSp>
+        <p:nvCxnSpPr>
+          <p:cNvPr id="8" name="Straight Arrow Connector 7">
+            <a:extLst>
+              <a:ext uri="{FF2B5EF4-FFF2-40B4-BE49-F238E27FC236}">
+                <a16:creationId xmlns:a16="http://schemas.microsoft.com/office/drawing/2014/main" id="{8C2D365D-9F85-E7C1-ADFC-21080F103529}"/>
+              </a:ext>
+            </a:extLst>
+          </p:cNvPr>
+          <p:cNvCxnSpPr/>
+          <p:nvPr/>
+        </p:nvCxnSpPr>
+        <p:spPr>
+          <a:xfrm flipH="1">
+            <a:off x="8085221" y="3601453"/>
+            <a:ext cx="505326" cy="1042736"/>
+          </a:xfrm>
+          <a:prstGeom prst="straightConnector1">
+            <a:avLst/>
+          </a:prstGeom>
+          <a:ln>
+            <a:tailEnd type="triangle"/>
+          </a:ln>
+        </p:spPr>
+        <p:style>
+          <a:lnRef idx="2">
+            <a:schemeClr val="accent4"/>
+          </a:lnRef>
+          <a:fillRef idx="0">
+            <a:schemeClr val="accent4"/>
+          </a:fillRef>
+          <a:effectRef idx="1">
+            <a:schemeClr val="accent4"/>
+          </a:effectRef>
+          <a:fontRef idx="minor">
+            <a:schemeClr val="tx1"/>
+          </a:fontRef>
+        </p:style>
+      </p:cxnSp>
+      <p:sp>
+        <p:nvSpPr>
+          <p:cNvPr id="9" name="TextBox 8">
+            <a:extLst>
+              <a:ext uri="{FF2B5EF4-FFF2-40B4-BE49-F238E27FC236}">
+                <a16:creationId xmlns:a16="http://schemas.microsoft.com/office/drawing/2014/main" id="{A5FB979D-691F-4D6B-DE94-07D68B63E851}"/>
+              </a:ext>
+            </a:extLst>
+          </p:cNvPr>
+          <p:cNvSpPr txBox="1"/>
+          <p:nvPr/>
+        </p:nvSpPr>
+        <p:spPr>
+          <a:xfrm flipH="1">
+            <a:off x="964811" y="1335257"/>
+            <a:ext cx="2716852" cy="369332"/>
+          </a:xfrm>
+          <a:prstGeom prst="rect">
+            <a:avLst/>
+          </a:prstGeom>
+          <a:solidFill>
+            <a:schemeClr val="accent4"/>
+          </a:solidFill>
+        </p:spPr>
+        <p:txBody>
+          <a:bodyPr wrap="square" rtlCol="0">
+            <a:spAutoFit/>
+          </a:bodyPr>
+          <a:lstStyle/>
+          <a:p>
+            <a:r>
+              <a:rPr lang="en-US" dirty="0"/>
+              <a:t>What ports are listening?</a:t>
+            </a:r>
+          </a:p>
+        </p:txBody>
+      </p:sp>
+    </p:spTree>
+    <p:extLst>
+      <p:ext uri="{BB962C8B-B14F-4D97-AF65-F5344CB8AC3E}">
+        <p14:creationId xmlns:p14="http://schemas.microsoft.com/office/powerpoint/2010/main" val="2170693840"/>
+      </p:ext>
+    </p:extLst>
+  </p:cSld>
+  <p:clrMapOvr>
+    <a:masterClrMapping/>
+  </p:clrMapOvr>
+</p:sld>
+</file>
+
+<file path=ppt/slides/slide19.xml><?xml version="1.0" encoding="utf-8"?>
+<p:sld xmlns:a="http://schemas.openxmlformats.org/drawingml/2006/main" xmlns:r="http://schemas.openxmlformats.org/officeDocument/2006/relationships" xmlns:p="http://schemas.openxmlformats.org/presentationml/2006/main">
+  <p:cSld>
+    <p:spTree>
+      <p:nvGrpSpPr>
+        <p:cNvPr id="1" name=""/>
+        <p:cNvGrpSpPr/>
+        <p:nvPr/>
+      </p:nvGrpSpPr>
+      <p:grpSpPr>
+        <a:xfrm>
+          <a:off x="0" y="0"/>
+          <a:ext cx="0" cy="0"/>
+          <a:chOff x="0" y="0"/>
+          <a:chExt cx="0" cy="0"/>
+        </a:xfrm>
+      </p:grpSpPr>
+      <p:sp>
+        <p:nvSpPr>
+          <p:cNvPr id="2" name="Title 1">
+            <a:extLst>
+              <a:ext uri="{FF2B5EF4-FFF2-40B4-BE49-F238E27FC236}">
+                <a16:creationId xmlns:a16="http://schemas.microsoft.com/office/drawing/2014/main" id="{48B9C957-31D1-8BE7-8F62-5D4007AEBE49}"/>
+              </a:ext>
+            </a:extLst>
+          </p:cNvPr>
+          <p:cNvSpPr>
+            <a:spLocks noGrp="1"/>
+          </p:cNvSpPr>
+          <p:nvPr>
+            <p:ph type="title"/>
+          </p:nvPr>
+        </p:nvSpPr>
+        <p:spPr/>
+        <p:txBody>
+          <a:bodyPr/>
+          <a:lstStyle/>
+          <a:p>
+            <a:r>
+              <a:rPr lang="en-US" dirty="0"/>
+              <a:t>Create a timeline with file timestamps</a:t>
+            </a:r>
+          </a:p>
+        </p:txBody>
+      </p:sp>
+      <p:sp>
+        <p:nvSpPr>
+          <p:cNvPr id="3" name="Text Placeholder 2">
+            <a:extLst>
+              <a:ext uri="{FF2B5EF4-FFF2-40B4-BE49-F238E27FC236}">
+                <a16:creationId xmlns:a16="http://schemas.microsoft.com/office/drawing/2014/main" id="{8551E564-23F0-3656-FC22-8BF6B1C4299E}"/>
+              </a:ext>
+            </a:extLst>
+          </p:cNvPr>
+          <p:cNvSpPr>
+            <a:spLocks noGrp="1"/>
+          </p:cNvSpPr>
+          <p:nvPr>
+            <p:ph type="body" idx="1"/>
+          </p:nvPr>
+        </p:nvSpPr>
+        <p:spPr/>
+        <p:txBody>
+          <a:bodyPr/>
+          <a:lstStyle/>
+          <a:p>
+            <a:endParaRPr lang="en-US"/>
+          </a:p>
+        </p:txBody>
+      </p:sp>
+    </p:spTree>
+    <p:extLst>
+      <p:ext uri="{BB962C8B-B14F-4D97-AF65-F5344CB8AC3E}">
+        <p14:creationId xmlns:p14="http://schemas.microsoft.com/office/powerpoint/2010/main" val="304707683"/>
+      </p:ext>
+    </p:extLst>
+  </p:cSld>
+  <p:clrMapOvr>
+    <a:masterClrMapping/>
+  </p:clrMapOvr>
+</p:sld>
+</file>
+
+<file path=ppt/slides/slide2.xml><?xml version="1.0" encoding="utf-8"?>
+<p:sld xmlns:a="http://schemas.openxmlformats.org/drawingml/2006/main" xmlns:r="http://schemas.openxmlformats.org/officeDocument/2006/relationships" xmlns:p="http://schemas.openxmlformats.org/presentationml/2006/main">
+  <p:cSld>
+    <p:spTree>
+      <p:nvGrpSpPr>
+        <p:cNvPr id="1" name=""/>
+        <p:cNvGrpSpPr/>
+        <p:nvPr/>
+      </p:nvGrpSpPr>
+      <p:grpSpPr>
+        <a:xfrm>
+          <a:off x="0" y="0"/>
+          <a:ext cx="0" cy="0"/>
+          <a:chOff x="0" y="0"/>
+          <a:chExt cx="0" cy="0"/>
+        </a:xfrm>
+      </p:grpSpPr>
+      <p:sp>
+        <p:nvSpPr>
+          <p:cNvPr id="2" name="Title 1">
+            <a:extLst>
+              <a:ext uri="{FF2B5EF4-FFF2-40B4-BE49-F238E27FC236}">
+                <a16:creationId xmlns:a16="http://schemas.microsoft.com/office/drawing/2014/main" id="{C53B0FF8-DEB6-931A-5E1F-C4A028898794}"/>
+              </a:ext>
+            </a:extLst>
+          </p:cNvPr>
+          <p:cNvSpPr>
+            <a:spLocks noGrp="1"/>
+          </p:cNvSpPr>
+          <p:nvPr>
+            <p:ph type="title"/>
+          </p:nvPr>
+        </p:nvSpPr>
+        <p:spPr/>
+        <p:txBody>
+          <a:bodyPr/>
+          <a:lstStyle/>
+          <a:p>
+            <a:r>
+              <a:rPr lang="en-US" dirty="0"/>
+              <a:t>Overview</a:t>
+            </a:r>
+          </a:p>
+        </p:txBody>
+      </p:sp>
+      <p:sp>
+        <p:nvSpPr>
+          <p:cNvPr id="3" name="Content Placeholder 2">
+            <a:extLst>
+              <a:ext uri="{FF2B5EF4-FFF2-40B4-BE49-F238E27FC236}">
+                <a16:creationId xmlns:a16="http://schemas.microsoft.com/office/drawing/2014/main" id="{BD5554A3-5995-2F3A-B024-D0D4F2E4D5FD}"/>
+              </a:ext>
+            </a:extLst>
+          </p:cNvPr>
+          <p:cNvSpPr>
+            <a:spLocks noGrp="1"/>
+          </p:cNvSpPr>
+          <p:nvPr>
+            <p:ph idx="1"/>
+          </p:nvPr>
+        </p:nvSpPr>
+        <p:spPr/>
+        <p:txBody>
+          <a:bodyPr/>
+          <a:lstStyle/>
+          <a:p>
+            <a:r>
+              <a:rPr lang="en-US" dirty="0"/>
+              <a:t>Memory and process</a:t>
+            </a:r>
+          </a:p>
+          <a:p>
+            <a:r>
+              <a:rPr lang="en-US" dirty="0"/>
+              <a:t>Analyze network ports used by Morris Worm</a:t>
+            </a:r>
+          </a:p>
+          <a:p>
+            <a:r>
+              <a:rPr lang="en-US" dirty="0"/>
+              <a:t>Analyze worm running processes</a:t>
+            </a:r>
+          </a:p>
+          <a:p>
+            <a:r>
+              <a:rPr lang="en-GB" dirty="0"/>
+              <a:t>Create a timeline with file timestamps</a:t>
+            </a:r>
+            <a:endParaRPr lang="en-US" dirty="0"/>
+          </a:p>
+        </p:txBody>
+      </p:sp>
+    </p:spTree>
+    <p:extLst>
+      <p:ext uri="{BB962C8B-B14F-4D97-AF65-F5344CB8AC3E}">
+        <p14:creationId xmlns:p14="http://schemas.microsoft.com/office/powerpoint/2010/main" val="1965449657"/>
+      </p:ext>
+    </p:extLst>
+  </p:cSld>
+  <p:clrMapOvr>
+    <a:masterClrMapping/>
+  </p:clrMapOvr>
+</p:sld>
+</file>
+
+<file path=ppt/slides/slide20.xml><?xml version="1.0" encoding="utf-8"?>
+<p:sld xmlns:a="http://schemas.openxmlformats.org/drawingml/2006/main" xmlns:r="http://schemas.openxmlformats.org/officeDocument/2006/relationships" xmlns:p="http://schemas.openxmlformats.org/presentationml/2006/main">
+  <p:cSld>
+    <p:spTree>
+      <p:nvGrpSpPr>
+        <p:cNvPr id="1" name=""/>
+        <p:cNvGrpSpPr/>
+        <p:nvPr/>
+      </p:nvGrpSpPr>
+      <p:grpSpPr>
+        <a:xfrm>
+          <a:off x="0" y="0"/>
+          <a:ext cx="0" cy="0"/>
+          <a:chOff x="0" y="0"/>
+          <a:chExt cx="0" cy="0"/>
+        </a:xfrm>
+      </p:grpSpPr>
+      <p:pic>
+        <p:nvPicPr>
           <p:cNvPr id="14" name="Picture 13">
             <a:extLst>
               <a:ext uri="{FF2B5EF4-FFF2-40B4-BE49-F238E27FC236}">
@@ -16908,7 +19095,7 @@
 </p:sld>
 </file>
 
-<file path=ppt/slides/slide11.xml><?xml version="1.0" encoding="utf-8"?>
+<file path=ppt/slides/slide21.xml><?xml version="1.0" encoding="utf-8"?>
 <p:sld xmlns:a="http://schemas.openxmlformats.org/drawingml/2006/main" xmlns:r="http://schemas.openxmlformats.org/officeDocument/2006/relationships" xmlns:p="http://schemas.openxmlformats.org/presentationml/2006/main">
   <p:cSld>
     <p:spTree>
@@ -17648,7 +19835,7 @@
 </p:sld>
 </file>
 
-<file path=ppt/slides/slide12.xml><?xml version="1.0" encoding="utf-8"?>
+<file path=ppt/slides/slide22.xml><?xml version="1.0" encoding="utf-8"?>
 <p:sld xmlns:a="http://schemas.openxmlformats.org/drawingml/2006/main" xmlns:r="http://schemas.openxmlformats.org/officeDocument/2006/relationships" xmlns:p="http://schemas.openxmlformats.org/presentationml/2006/main">
   <p:cSld>
     <p:spTree>
@@ -17809,7 +19996,7 @@
 </p:sld>
 </file>
 
-<file path=ppt/slides/slide13.xml><?xml version="1.0" encoding="utf-8"?>
+<file path=ppt/slides/slide23.xml><?xml version="1.0" encoding="utf-8"?>
 <p:sld xmlns:a="http://schemas.openxmlformats.org/drawingml/2006/main" xmlns:r="http://schemas.openxmlformats.org/officeDocument/2006/relationships" xmlns:p="http://schemas.openxmlformats.org/presentationml/2006/main">
   <p:cSld>
     <p:spTree>
@@ -18515,7 +20702,7 @@
 </p:sld>
 </file>
 
-<file path=ppt/slides/slide14.xml><?xml version="1.0" encoding="utf-8"?>
+<file path=ppt/slides/slide24.xml><?xml version="1.0" encoding="utf-8"?>
 <p:sld xmlns:a="http://schemas.openxmlformats.org/drawingml/2006/main" xmlns:r="http://schemas.openxmlformats.org/officeDocument/2006/relationships" xmlns:p="http://schemas.openxmlformats.org/presentationml/2006/main">
   <p:cSld>
     <p:spTree>
@@ -18693,7 +20880,7 @@
 </p:sld>
 </file>
 
-<file path=ppt/slides/slide15.xml><?xml version="1.0" encoding="utf-8"?>
+<file path=ppt/slides/slide25.xml><?xml version="1.0" encoding="utf-8"?>
 <p:sld xmlns:a="http://schemas.openxmlformats.org/drawingml/2006/main" xmlns:r="http://schemas.openxmlformats.org/officeDocument/2006/relationships" xmlns:p="http://schemas.openxmlformats.org/presentationml/2006/main">
   <p:cSld>
     <p:spTree>
@@ -18852,7 +21039,7 @@
 </p:sld>
 </file>
 
-<file path=ppt/slides/slide16.xml><?xml version="1.0" encoding="utf-8"?>
+<file path=ppt/slides/slide26.xml><?xml version="1.0" encoding="utf-8"?>
 <p:sld xmlns:a="http://schemas.openxmlformats.org/drawingml/2006/main" xmlns:r="http://schemas.openxmlformats.org/officeDocument/2006/relationships" xmlns:p="http://schemas.openxmlformats.org/presentationml/2006/main">
   <p:cSld>
     <p:spTree>
@@ -20540,7 +22727,7 @@
 </p:sld>
 </file>
 
-<file path=ppt/slides/slide17.xml><?xml version="1.0" encoding="utf-8"?>
+<file path=ppt/slides/slide27.xml><?xml version="1.0" encoding="utf-8"?>
 <p:sld xmlns:a="http://schemas.openxmlformats.org/drawingml/2006/main" xmlns:r="http://schemas.openxmlformats.org/officeDocument/2006/relationships" xmlns:p="http://schemas.openxmlformats.org/presentationml/2006/main">
   <p:cSld>
     <p:spTree>
@@ -20628,105 +22815,6 @@
 </p:sld>
 </file>
 
-<file path=ppt/slides/slide2.xml><?xml version="1.0" encoding="utf-8"?>
-<p:sld xmlns:a="http://schemas.openxmlformats.org/drawingml/2006/main" xmlns:r="http://schemas.openxmlformats.org/officeDocument/2006/relationships" xmlns:p="http://schemas.openxmlformats.org/presentationml/2006/main">
-  <p:cSld>
-    <p:spTree>
-      <p:nvGrpSpPr>
-        <p:cNvPr id="1" name=""/>
-        <p:cNvGrpSpPr/>
-        <p:nvPr/>
-      </p:nvGrpSpPr>
-      <p:grpSpPr>
-        <a:xfrm>
-          <a:off x="0" y="0"/>
-          <a:ext cx="0" cy="0"/>
-          <a:chOff x="0" y="0"/>
-          <a:chExt cx="0" cy="0"/>
-        </a:xfrm>
-      </p:grpSpPr>
-      <p:sp>
-        <p:nvSpPr>
-          <p:cNvPr id="2" name="Title 1">
-            <a:extLst>
-              <a:ext uri="{FF2B5EF4-FFF2-40B4-BE49-F238E27FC236}">
-                <a16:creationId xmlns:a16="http://schemas.microsoft.com/office/drawing/2014/main" id="{C53B0FF8-DEB6-931A-5E1F-C4A028898794}"/>
-              </a:ext>
-            </a:extLst>
-          </p:cNvPr>
-          <p:cNvSpPr>
-            <a:spLocks noGrp="1"/>
-          </p:cNvSpPr>
-          <p:nvPr>
-            <p:ph type="title"/>
-          </p:nvPr>
-        </p:nvSpPr>
-        <p:spPr/>
-        <p:txBody>
-          <a:bodyPr/>
-          <a:lstStyle/>
-          <a:p>
-            <a:r>
-              <a:rPr lang="en-US" dirty="0"/>
-              <a:t>Overview</a:t>
-            </a:r>
-          </a:p>
-        </p:txBody>
-      </p:sp>
-      <p:sp>
-        <p:nvSpPr>
-          <p:cNvPr id="3" name="Content Placeholder 2">
-            <a:extLst>
-              <a:ext uri="{FF2B5EF4-FFF2-40B4-BE49-F238E27FC236}">
-                <a16:creationId xmlns:a16="http://schemas.microsoft.com/office/drawing/2014/main" id="{BD5554A3-5995-2F3A-B024-D0D4F2E4D5FD}"/>
-              </a:ext>
-            </a:extLst>
-          </p:cNvPr>
-          <p:cNvSpPr>
-            <a:spLocks noGrp="1"/>
-          </p:cNvSpPr>
-          <p:nvPr>
-            <p:ph idx="1"/>
-          </p:nvPr>
-        </p:nvSpPr>
-        <p:spPr/>
-        <p:txBody>
-          <a:bodyPr/>
-          <a:lstStyle/>
-          <a:p>
-            <a:r>
-              <a:rPr lang="en-US" dirty="0"/>
-              <a:t>Analyze network ports used by worm</a:t>
-            </a:r>
-          </a:p>
-          <a:p>
-            <a:r>
-              <a:rPr lang="en-US" dirty="0"/>
-              <a:t>Analyze worm running processes</a:t>
-            </a:r>
-          </a:p>
-          <a:p>
-            <a:r>
-              <a:rPr lang="en-GB" dirty="0"/>
-              <a:t>Create a timeline with file timestamps</a:t>
-            </a:r>
-            <a:endParaRPr lang="en-US" dirty="0"/>
-          </a:p>
-        </p:txBody>
-      </p:sp>
-    </p:spTree>
-    <p:extLst>
-      <p:ext uri="{BB962C8B-B14F-4D97-AF65-F5344CB8AC3E}">
-        <p14:creationId xmlns:p14="http://schemas.microsoft.com/office/powerpoint/2010/main" val="1965449657"/>
-      </p:ext>
-    </p:extLst>
-  </p:cSld>
-  <p:clrMapOvr>
-    <a:masterClrMapping/>
-  </p:clrMapOvr>
-</p:sld>
-</file>
-
 <file path=ppt/slides/slide3.xml><?xml version="1.0" encoding="utf-8"?>
 <p:sld xmlns:a="http://schemas.openxmlformats.org/drawingml/2006/main" xmlns:r="http://schemas.openxmlformats.org/officeDocument/2006/relationships" xmlns:p="http://schemas.openxmlformats.org/presentationml/2006/main">
   <p:cSld>
@@ -20749,7 +22837,7 @@
           <p:cNvPr id="4" name="Title 3">
             <a:extLst>
               <a:ext uri="{FF2B5EF4-FFF2-40B4-BE49-F238E27FC236}">
-                <a16:creationId xmlns:a16="http://schemas.microsoft.com/office/drawing/2014/main" id="{F55C460F-56BB-A17B-9F04-1F9528C051B8}"/>
+                <a16:creationId xmlns:a16="http://schemas.microsoft.com/office/drawing/2014/main" id="{31A48972-6ECB-ECC1-AA14-D03414D99212}"/>
               </a:ext>
             </a:extLst>
           </p:cNvPr>
@@ -20766,14 +22854,9 @@
           <a:lstStyle/>
           <a:p>
             <a:r>
-              <a:rPr lang="en-GB" dirty="0" err="1"/>
-              <a:t>Analyze</a:t>
+              <a:rPr lang="en-US" dirty="0"/>
+              <a:t>Memory and Process</a:t>
             </a:r>
-            <a:r>
-              <a:rPr lang="en-GB" dirty="0"/>
-              <a:t> network ports used by worm</a:t>
-            </a:r>
-            <a:endParaRPr lang="en-US" dirty="0"/>
           </a:p>
         </p:txBody>
       </p:sp>
@@ -20782,7 +22865,7 @@
           <p:cNvPr id="5" name="Text Placeholder 4">
             <a:extLst>
               <a:ext uri="{FF2B5EF4-FFF2-40B4-BE49-F238E27FC236}">
-                <a16:creationId xmlns:a16="http://schemas.microsoft.com/office/drawing/2014/main" id="{BFF13C6C-45F4-C757-8B79-9A8E8D32D090}"/>
+                <a16:creationId xmlns:a16="http://schemas.microsoft.com/office/drawing/2014/main" id="{0AFA1967-7E41-8305-36A1-C741B0127E68}"/>
               </a:ext>
             </a:extLst>
           </p:cNvPr>
@@ -20798,14 +22881,18 @@
           <a:bodyPr/>
           <a:lstStyle/>
           <a:p>
-            <a:endParaRPr lang="en-US"/>
+            <a:r>
+              <a:rPr lang="en-GB" dirty="0"/>
+              <a:t>A process is the instance of a computer program that is being executed by one or many threads. </a:t>
+            </a:r>
+            <a:endParaRPr lang="en-US" dirty="0"/>
           </a:p>
         </p:txBody>
       </p:sp>
     </p:spTree>
     <p:extLst>
       <p:ext uri="{BB962C8B-B14F-4D97-AF65-F5344CB8AC3E}">
-        <p14:creationId xmlns:p14="http://schemas.microsoft.com/office/powerpoint/2010/main" val="1402944920"/>
+        <p14:creationId xmlns:p14="http://schemas.microsoft.com/office/powerpoint/2010/main" val="1034356353"/>
       </p:ext>
     </p:extLst>
   </p:cSld>
@@ -20834,38 +22921,55 @@
       </p:grpSpPr>
       <p:pic>
         <p:nvPicPr>
-          <p:cNvPr id="3" name="Picture 2">
+          <p:cNvPr id="1026" name="Picture 2" descr="Process (computing) - Wikipedia">
             <a:extLst>
               <a:ext uri="{FF2B5EF4-FFF2-40B4-BE49-F238E27FC236}">
-                <a16:creationId xmlns:a16="http://schemas.microsoft.com/office/drawing/2014/main" id="{2BC73066-5719-D6E0-F846-5BD60573DA5A}"/>
+                <a16:creationId xmlns:a16="http://schemas.microsoft.com/office/drawing/2014/main" id="{2612B53D-A79A-1C9B-7E05-CF16FDA07882}"/>
               </a:ext>
             </a:extLst>
           </p:cNvPr>
           <p:cNvPicPr>
-            <a:picLocks noChangeAspect="1"/>
+            <a:picLocks noChangeAspect="1" noChangeArrowheads="1"/>
           </p:cNvPicPr>
           <p:nvPr/>
         </p:nvPicPr>
         <p:blipFill>
-          <a:blip r:embed="rId2"/>
+          <a:blip r:embed="rId2">
+            <a:extLst>
+              <a:ext uri="{28A0092B-C50C-407E-A947-70E740481C1C}">
+                <a14:useLocalDpi xmlns:a14="http://schemas.microsoft.com/office/drawing/2010/main" val="0"/>
+              </a:ext>
+            </a:extLst>
+          </a:blip>
+          <a:srcRect/>
           <a:stretch>
             <a:fillRect/>
           </a:stretch>
         </p:blipFill>
-        <p:spPr>
+        <p:spPr bwMode="auto">
           <a:xfrm>
-            <a:off x="1206079" y="0"/>
-            <a:ext cx="9779841" cy="6858000"/>
+            <a:off x="381000" y="128588"/>
+            <a:ext cx="11430000" cy="6600825"/>
           </a:xfrm>
           <a:prstGeom prst="rect">
             <a:avLst/>
           </a:prstGeom>
+          <a:noFill/>
+          <a:extLst>
+            <a:ext uri="{909E8E84-426E-40DD-AFC4-6F175D3DCCD1}">
+              <a14:hiddenFill xmlns:a14="http://schemas.microsoft.com/office/drawing/2010/main">
+                <a:solidFill>
+                  <a:srgbClr val="FFFFFF"/>
+                </a:solidFill>
+              </a14:hiddenFill>
+            </a:ext>
+          </a:extLst>
         </p:spPr>
       </p:pic>
     </p:spTree>
     <p:extLst>
       <p:ext uri="{BB962C8B-B14F-4D97-AF65-F5344CB8AC3E}">
-        <p14:creationId xmlns:p14="http://schemas.microsoft.com/office/powerpoint/2010/main" val="4201276766"/>
+        <p14:creationId xmlns:p14="http://schemas.microsoft.com/office/powerpoint/2010/main" val="2146548294"/>
       </p:ext>
     </p:extLst>
   </p:cSld>
@@ -20892,12 +22996,50 @@
           <a:chExt cx="0" cy="0"/>
         </a:xfrm>
       </p:grpSpPr>
+      <p:sp>
+        <p:nvSpPr>
+          <p:cNvPr id="3" name="TextBox 2">
+            <a:extLst>
+              <a:ext uri="{FF2B5EF4-FFF2-40B4-BE49-F238E27FC236}">
+                <a16:creationId xmlns:a16="http://schemas.microsoft.com/office/drawing/2014/main" id="{17B02E9C-8C7F-4441-F2DE-81C515664F9F}"/>
+              </a:ext>
+            </a:extLst>
+          </p:cNvPr>
+          <p:cNvSpPr txBox="1"/>
+          <p:nvPr/>
+        </p:nvSpPr>
+        <p:spPr>
+          <a:xfrm>
+            <a:off x="356729" y="899184"/>
+            <a:ext cx="3362826" cy="369332"/>
+          </a:xfrm>
+          <a:prstGeom prst="rect">
+            <a:avLst/>
+          </a:prstGeom>
+          <a:solidFill>
+            <a:schemeClr val="accent4"/>
+          </a:solidFill>
+        </p:spPr>
+        <p:txBody>
+          <a:bodyPr wrap="square">
+            <a:spAutoFit/>
+          </a:bodyPr>
+          <a:lstStyle/>
+          <a:p>
+            <a:r>
+              <a:rPr lang="en-GB" dirty="0"/>
+              <a:t>List All Processes in Current Shell</a:t>
+            </a:r>
+            <a:endParaRPr lang="en-US" dirty="0"/>
+          </a:p>
+        </p:txBody>
+      </p:sp>
       <p:pic>
         <p:nvPicPr>
-          <p:cNvPr id="3" name="Picture 2">
+          <p:cNvPr id="5" name="Picture 4">
             <a:extLst>
               <a:ext uri="{FF2B5EF4-FFF2-40B4-BE49-F238E27FC236}">
-                <a16:creationId xmlns:a16="http://schemas.microsoft.com/office/drawing/2014/main" id="{16A695F2-870F-964C-2BD2-5BF2907DF762}"/>
+                <a16:creationId xmlns:a16="http://schemas.microsoft.com/office/drawing/2014/main" id="{F8E487A2-8101-2505-52A2-C5EC3A2A4812}"/>
               </a:ext>
             </a:extLst>
           </p:cNvPr>
@@ -20907,15 +23049,15 @@
           <p:nvPr/>
         </p:nvPicPr>
         <p:blipFill>
-          <a:blip r:embed="rId2"/>
+          <a:blip r:embed="rId3"/>
           <a:stretch>
             <a:fillRect/>
           </a:stretch>
         </p:blipFill>
         <p:spPr>
           <a:xfrm>
-            <a:off x="1182193" y="355823"/>
-            <a:ext cx="7178662" cy="4861981"/>
+            <a:off x="356729" y="1268516"/>
+            <a:ext cx="4846740" cy="1425063"/>
           </a:xfrm>
           <a:prstGeom prst="rect">
             <a:avLst/>
@@ -20924,10 +23066,10 @@
       </p:pic>
       <p:pic>
         <p:nvPicPr>
-          <p:cNvPr id="5" name="Picture 4">
+          <p:cNvPr id="7" name="Picture 6">
             <a:extLst>
               <a:ext uri="{FF2B5EF4-FFF2-40B4-BE49-F238E27FC236}">
-                <a16:creationId xmlns:a16="http://schemas.microsoft.com/office/drawing/2014/main" id="{D872A1EC-D070-33F0-4C0A-20430FA7F90A}"/>
+                <a16:creationId xmlns:a16="http://schemas.microsoft.com/office/drawing/2014/main" id="{DB53ACFA-F41D-383A-CCB7-A59C60F8C58F}"/>
               </a:ext>
             </a:extLst>
           </p:cNvPr>
@@ -20936,15 +23078,16 @@
           </p:cNvPicPr>
           <p:nvPr/>
         </p:nvPicPr>
-        <p:blipFill rotWithShape="1">
-          <a:blip r:embed="rId3"/>
-          <a:srcRect r="1977"/>
-          <a:stretch/>
+        <p:blipFill>
+          <a:blip r:embed="rId4"/>
+          <a:stretch>
+            <a:fillRect/>
+          </a:stretch>
         </p:blipFill>
         <p:spPr>
           <a:xfrm>
-            <a:off x="1182194" y="5454071"/>
-            <a:ext cx="7178662" cy="1021168"/>
+            <a:off x="5783179" y="1268516"/>
+            <a:ext cx="5959356" cy="5220152"/>
           </a:xfrm>
           <a:prstGeom prst="rect">
             <a:avLst/>
@@ -20953,10 +23096,10 @@
       </p:pic>
       <p:sp>
         <p:nvSpPr>
-          <p:cNvPr id="6" name="TextBox 5">
+          <p:cNvPr id="8" name="TextBox 7">
             <a:extLst>
               <a:ext uri="{FF2B5EF4-FFF2-40B4-BE49-F238E27FC236}">
-                <a16:creationId xmlns:a16="http://schemas.microsoft.com/office/drawing/2014/main" id="{A51C1D4B-D498-65AF-B6D7-0843007D004E}"/>
+                <a16:creationId xmlns:a16="http://schemas.microsoft.com/office/drawing/2014/main" id="{6E5087F5-CE1C-989C-4B91-C2AAE9D25C8F}"/>
               </a:ext>
             </a:extLst>
           </p:cNvPr>
@@ -20965,84 +23108,8 @@
         </p:nvSpPr>
         <p:spPr>
           <a:xfrm>
-            <a:off x="8963025" y="1685925"/>
-            <a:ext cx="1827231" cy="369332"/>
-          </a:xfrm>
-          <a:prstGeom prst="rect">
-            <a:avLst/>
-          </a:prstGeom>
-          <a:noFill/>
-        </p:spPr>
-        <p:txBody>
-          <a:bodyPr wrap="none" rtlCol="0">
-            <a:spAutoFit/>
-          </a:bodyPr>
-          <a:lstStyle/>
-          <a:p>
-            <a:r>
-              <a:rPr lang="en-US" dirty="0">
-                <a:latin typeface="Britannic Bold" panose="020B0903060703020204" pitchFamily="34" charset="0"/>
-              </a:rPr>
-              <a:t>worm.py </a:t>
-            </a:r>
-            <a:r>
-              <a:rPr lang="en-US" dirty="0"/>
-              <a:t>process</a:t>
-            </a:r>
-          </a:p>
-        </p:txBody>
-      </p:sp>
-      <p:sp>
-        <p:nvSpPr>
-          <p:cNvPr id="7" name="TextBox 6">
-            <a:extLst>
-              <a:ext uri="{FF2B5EF4-FFF2-40B4-BE49-F238E27FC236}">
-                <a16:creationId xmlns:a16="http://schemas.microsoft.com/office/drawing/2014/main" id="{F92868F1-C02F-4D62-9DA3-DE837B601586}"/>
-              </a:ext>
-            </a:extLst>
-          </p:cNvPr>
-          <p:cNvSpPr txBox="1"/>
-          <p:nvPr/>
-        </p:nvSpPr>
-        <p:spPr>
-          <a:xfrm>
-            <a:off x="8763000" y="5454071"/>
-            <a:ext cx="2197140" cy="369332"/>
-          </a:xfrm>
-          <a:prstGeom prst="rect">
-            <a:avLst/>
-          </a:prstGeom>
-          <a:noFill/>
-        </p:spPr>
-        <p:txBody>
-          <a:bodyPr wrap="none" rtlCol="0">
-            <a:spAutoFit/>
-          </a:bodyPr>
-          <a:lstStyle/>
-          <a:p>
-            <a:r>
-              <a:rPr lang="en-US" dirty="0"/>
-              <a:t>listening to port 9999</a:t>
-            </a:r>
-          </a:p>
-        </p:txBody>
-      </p:sp>
-      <p:sp>
-        <p:nvSpPr>
-          <p:cNvPr id="8" name="TextBox 7">
-            <a:extLst>
-              <a:ext uri="{FF2B5EF4-FFF2-40B4-BE49-F238E27FC236}">
-                <a16:creationId xmlns:a16="http://schemas.microsoft.com/office/drawing/2014/main" id="{82EAB93D-6235-E491-1766-A4C8E7C1ECDB}"/>
-              </a:ext>
-            </a:extLst>
-          </p:cNvPr>
-          <p:cNvSpPr txBox="1"/>
-          <p:nvPr/>
-        </p:nvSpPr>
-        <p:spPr>
-          <a:xfrm flipH="1">
-            <a:off x="1182193" y="0"/>
-            <a:ext cx="3109883" cy="369332"/>
+            <a:off x="5783179" y="828097"/>
+            <a:ext cx="3362826" cy="369332"/>
           </a:xfrm>
           <a:prstGeom prst="rect">
             <a:avLst/>
@@ -21052,22 +23119,140 @@
           </a:solidFill>
         </p:spPr>
         <p:txBody>
-          <a:bodyPr wrap="square" rtlCol="0">
+          <a:bodyPr wrap="square">
             <a:spAutoFit/>
           </a:bodyPr>
           <a:lstStyle/>
           <a:p>
             <a:r>
-              <a:rPr lang="en-US" dirty="0"/>
-              <a:t>Check processes</a:t>
+              <a:rPr lang="en-GB" dirty="0"/>
+              <a:t>Help function</a:t>
             </a:r>
+            <a:endParaRPr lang="en-US" dirty="0"/>
           </a:p>
         </p:txBody>
       </p:sp>
+      <p:sp>
+        <p:nvSpPr>
+          <p:cNvPr id="10" name="TextBox 9">
+            <a:extLst>
+              <a:ext uri="{FF2B5EF4-FFF2-40B4-BE49-F238E27FC236}">
+                <a16:creationId xmlns:a16="http://schemas.microsoft.com/office/drawing/2014/main" id="{402DF54C-7931-D0F2-7DFE-6F19E2959F13}"/>
+              </a:ext>
+            </a:extLst>
+          </p:cNvPr>
+          <p:cNvSpPr txBox="1"/>
+          <p:nvPr/>
+        </p:nvSpPr>
+        <p:spPr>
+          <a:xfrm>
+            <a:off x="527384" y="3364104"/>
+            <a:ext cx="4565984" cy="2031325"/>
+          </a:xfrm>
+          <a:prstGeom prst="rect">
+            <a:avLst/>
+          </a:prstGeom>
+          <a:noFill/>
+        </p:spPr>
+        <p:txBody>
+          <a:bodyPr wrap="square">
+            <a:spAutoFit/>
+          </a:bodyPr>
+          <a:lstStyle/>
+          <a:p>
+            <a:r>
+              <a:rPr lang="en-GB" b="1" dirty="0"/>
+              <a:t>PID</a:t>
+            </a:r>
+            <a:r>
+              <a:rPr lang="en-GB" dirty="0"/>
+              <a:t>: The process ID number of the process.</a:t>
+            </a:r>
+          </a:p>
+          <a:p>
+            <a:r>
+              <a:rPr lang="en-GB" b="1" dirty="0"/>
+              <a:t>TTY (Teletypewriter)</a:t>
+            </a:r>
+            <a:r>
+              <a:rPr lang="en-GB" dirty="0"/>
+              <a:t>: The name of the console that the user is logged in at.</a:t>
+            </a:r>
+          </a:p>
+          <a:p>
+            <a:r>
+              <a:rPr lang="en-GB" b="1" dirty="0"/>
+              <a:t>TIME</a:t>
+            </a:r>
+            <a:r>
+              <a:rPr lang="en-GB" dirty="0"/>
+              <a:t>: The amount of CPU processing time that the process has used.</a:t>
+            </a:r>
+          </a:p>
+          <a:p>
+            <a:r>
+              <a:rPr lang="en-GB" b="1" dirty="0"/>
+              <a:t>CMD</a:t>
+            </a:r>
+            <a:r>
+              <a:rPr lang="en-GB" dirty="0"/>
+              <a:t>: The name of the command that launched the process</a:t>
+            </a:r>
+            <a:endParaRPr lang="en-US" dirty="0"/>
+          </a:p>
+        </p:txBody>
+      </p:sp>
+      <p:pic>
+        <p:nvPicPr>
+          <p:cNvPr id="2050" name="Picture 2" descr="lgp 30 early computer 1956">
+            <a:extLst>
+              <a:ext uri="{FF2B5EF4-FFF2-40B4-BE49-F238E27FC236}">
+                <a16:creationId xmlns:a16="http://schemas.microsoft.com/office/drawing/2014/main" id="{D6F62A89-3C58-AD9D-D01E-E37E8571A9EB}"/>
+              </a:ext>
+            </a:extLst>
+          </p:cNvPr>
+          <p:cNvPicPr>
+            <a:picLocks noChangeAspect="1" noChangeArrowheads="1"/>
+          </p:cNvPicPr>
+          <p:nvPr/>
+        </p:nvPicPr>
+        <p:blipFill>
+          <a:blip r:embed="rId5">
+            <a:extLst>
+              <a:ext uri="{28A0092B-C50C-407E-A947-70E740481C1C}">
+                <a14:useLocalDpi xmlns:a14="http://schemas.microsoft.com/office/drawing/2010/main" val="0"/>
+              </a:ext>
+            </a:extLst>
+          </a:blip>
+          <a:srcRect/>
+          <a:stretch>
+            <a:fillRect/>
+          </a:stretch>
+        </p:blipFill>
+        <p:spPr bwMode="auto">
+          <a:xfrm>
+            <a:off x="3224463" y="5576637"/>
+            <a:ext cx="1708484" cy="1281363"/>
+          </a:xfrm>
+          <a:prstGeom prst="rect">
+            <a:avLst/>
+          </a:prstGeom>
+          <a:noFill/>
+          <a:extLst>
+            <a:ext uri="{909E8E84-426E-40DD-AFC4-6F175D3DCCD1}">
+              <a14:hiddenFill xmlns:a14="http://schemas.microsoft.com/office/drawing/2010/main">
+                <a:solidFill>
+                  <a:srgbClr val="FFFFFF"/>
+                </a:solidFill>
+              </a14:hiddenFill>
+            </a:ext>
+          </a:extLst>
+        </p:spPr>
+      </p:pic>
     </p:spTree>
     <p:extLst>
       <p:ext uri="{BB962C8B-B14F-4D97-AF65-F5344CB8AC3E}">
-        <p14:creationId xmlns:p14="http://schemas.microsoft.com/office/powerpoint/2010/main" val="2049237961"/>
+        <p14:creationId xmlns:p14="http://schemas.microsoft.com/office/powerpoint/2010/main" val="273989082"/>
       </p:ext>
     </p:extLst>
   </p:cSld>
@@ -21094,12 +23279,62 @@
           <a:chExt cx="0" cy="0"/>
         </a:xfrm>
       </p:grpSpPr>
+      <p:sp>
+        <p:nvSpPr>
+          <p:cNvPr id="3" name="TextBox 2">
+            <a:extLst>
+              <a:ext uri="{FF2B5EF4-FFF2-40B4-BE49-F238E27FC236}">
+                <a16:creationId xmlns:a16="http://schemas.microsoft.com/office/drawing/2014/main" id="{8964F884-74FF-C484-8C11-E1360B800B3F}"/>
+              </a:ext>
+            </a:extLst>
+          </p:cNvPr>
+          <p:cNvSpPr txBox="1"/>
+          <p:nvPr/>
+        </p:nvSpPr>
+        <p:spPr>
+          <a:xfrm>
+            <a:off x="1770647" y="1134797"/>
+            <a:ext cx="2937711" cy="646331"/>
+          </a:xfrm>
+          <a:prstGeom prst="rect">
+            <a:avLst/>
+          </a:prstGeom>
+          <a:solidFill>
+            <a:schemeClr val="accent4"/>
+          </a:solidFill>
+        </p:spPr>
+        <p:txBody>
+          <a:bodyPr wrap="square">
+            <a:spAutoFit/>
+          </a:bodyPr>
+          <a:lstStyle/>
+          <a:p>
+            <a:r>
+              <a:rPr lang="en-GB" dirty="0"/>
+              <a:t>Listing (s</a:t>
+            </a:r>
+            <a:r>
+              <a:rPr lang="en-GB" b="1" dirty="0">
+                <a:solidFill>
+                  <a:srgbClr val="FF0000"/>
+                </a:solidFill>
+              </a:rPr>
+              <a:t>e</a:t>
+            </a:r>
+            <a:r>
+              <a:rPr lang="en-GB" dirty="0"/>
+              <a:t>lecting all) Process for All Users</a:t>
+            </a:r>
+            <a:endParaRPr lang="en-US" dirty="0"/>
+          </a:p>
+        </p:txBody>
+      </p:sp>
       <p:pic>
         <p:nvPicPr>
-          <p:cNvPr id="3" name="Picture 2">
+          <p:cNvPr id="5" name="Picture 4">
             <a:extLst>
               <a:ext uri="{FF2B5EF4-FFF2-40B4-BE49-F238E27FC236}">
-                <a16:creationId xmlns:a16="http://schemas.microsoft.com/office/drawing/2014/main" id="{7028B884-C865-B179-DB74-C783E486585C}"/>
+                <a16:creationId xmlns:a16="http://schemas.microsoft.com/office/drawing/2014/main" id="{E0D00852-C107-25BF-D7CA-898A6F092C78}"/>
               </a:ext>
             </a:extLst>
           </p:cNvPr>
@@ -21116,8 +23351,8 @@
         </p:blipFill>
         <p:spPr>
           <a:xfrm>
-            <a:off x="1742708" y="700803"/>
-            <a:ext cx="8458933" cy="5456393"/>
+            <a:off x="1770647" y="1504129"/>
+            <a:ext cx="5243014" cy="2804403"/>
           </a:xfrm>
           <a:prstGeom prst="rect">
             <a:avLst/>
@@ -21126,10 +23361,10 @@
       </p:pic>
       <p:sp>
         <p:nvSpPr>
-          <p:cNvPr id="4" name="TextBox 3">
+          <p:cNvPr id="7" name="TextBox 6">
             <a:extLst>
               <a:ext uri="{FF2B5EF4-FFF2-40B4-BE49-F238E27FC236}">
-                <a16:creationId xmlns:a16="http://schemas.microsoft.com/office/drawing/2014/main" id="{D93B7AA0-0F6A-8FFC-949A-DAB9F8B6E0C7}"/>
+                <a16:creationId xmlns:a16="http://schemas.microsoft.com/office/drawing/2014/main" id="{98DD7E51-B99E-CFBF-C0E8-ACFC63B854BD}"/>
               </a:ext>
             </a:extLst>
           </p:cNvPr>
@@ -21137,34 +23372,138 @@
           <p:nvPr/>
         </p:nvSpPr>
         <p:spPr>
-          <a:xfrm flipH="1">
-            <a:off x="1742708" y="331471"/>
-            <a:ext cx="3109883" cy="369332"/>
+          <a:xfrm>
+            <a:off x="1987216" y="5113240"/>
+            <a:ext cx="3860132" cy="369332"/>
           </a:xfrm>
           <a:prstGeom prst="rect">
             <a:avLst/>
           </a:prstGeom>
           <a:solidFill>
-            <a:schemeClr val="accent4"/>
+            <a:schemeClr val="accent4">
+              <a:lumMod val="20000"/>
+              <a:lumOff val="80000"/>
+            </a:schemeClr>
           </a:solidFill>
         </p:spPr>
         <p:txBody>
-          <a:bodyPr wrap="square" rtlCol="0">
+          <a:bodyPr wrap="square">
             <a:spAutoFit/>
           </a:bodyPr>
           <a:lstStyle/>
           <a:p>
             <a:r>
-              <a:rPr lang="en-US" dirty="0"/>
-              <a:t>Another machine</a:t>
+              <a:rPr lang="en-GB" b="0" i="0" dirty="0">
+                <a:solidFill>
+                  <a:srgbClr val="404040"/>
+                </a:solidFill>
+                <a:effectLst/>
+                <a:latin typeface="Roboto" panose="02000000000000000000" pitchFamily="2" charset="0"/>
+              </a:rPr>
+              <a:t>not started from a terminal window.</a:t>
             </a:r>
+            <a:endParaRPr lang="en-US" dirty="0"/>
           </a:p>
         </p:txBody>
       </p:sp>
+      <p:sp>
+        <p:nvSpPr>
+          <p:cNvPr id="8" name="Rectangle 7">
+            <a:extLst>
+              <a:ext uri="{FF2B5EF4-FFF2-40B4-BE49-F238E27FC236}">
+                <a16:creationId xmlns:a16="http://schemas.microsoft.com/office/drawing/2014/main" id="{DD970FEB-F75D-20DA-4339-8C799D058BE2}"/>
+              </a:ext>
+            </a:extLst>
+          </p:cNvPr>
+          <p:cNvSpPr/>
+          <p:nvPr/>
+        </p:nvSpPr>
+        <p:spPr>
+          <a:xfrm>
+            <a:off x="2510590" y="3810000"/>
+            <a:ext cx="184484" cy="192505"/>
+          </a:xfrm>
+          <a:prstGeom prst="rect">
+            <a:avLst/>
+          </a:prstGeom>
+          <a:noFill/>
+          <a:ln>
+            <a:solidFill>
+              <a:srgbClr val="FF0000"/>
+            </a:solidFill>
+          </a:ln>
+        </p:spPr>
+        <p:style>
+          <a:lnRef idx="2">
+            <a:schemeClr val="accent1">
+              <a:shade val="50000"/>
+            </a:schemeClr>
+          </a:lnRef>
+          <a:fillRef idx="1">
+            <a:schemeClr val="accent1"/>
+          </a:fillRef>
+          <a:effectRef idx="0">
+            <a:schemeClr val="accent1"/>
+          </a:effectRef>
+          <a:fontRef idx="minor">
+            <a:schemeClr val="lt1"/>
+          </a:fontRef>
+        </p:style>
+        <p:txBody>
+          <a:bodyPr rtlCol="0" anchor="ctr"/>
+          <a:lstStyle/>
+          <a:p>
+            <a:pPr algn="ctr"/>
+            <a:endParaRPr lang="en-US"/>
+          </a:p>
+        </p:txBody>
+      </p:sp>
+      <p:cxnSp>
+        <p:nvCxnSpPr>
+          <p:cNvPr id="10" name="Straight Arrow Connector 9">
+            <a:extLst>
+              <a:ext uri="{FF2B5EF4-FFF2-40B4-BE49-F238E27FC236}">
+                <a16:creationId xmlns:a16="http://schemas.microsoft.com/office/drawing/2014/main" id="{E8161131-E849-6D41-4B3D-7CB4C9233376}"/>
+              </a:ext>
+            </a:extLst>
+          </p:cNvPr>
+          <p:cNvCxnSpPr>
+            <a:cxnSpLocks/>
+            <a:endCxn id="7" idx="0"/>
+          </p:cNvCxnSpPr>
+          <p:nvPr/>
+        </p:nvCxnSpPr>
+        <p:spPr>
+          <a:xfrm>
+            <a:off x="2695074" y="4002505"/>
+            <a:ext cx="1222208" cy="1110735"/>
+          </a:xfrm>
+          <a:prstGeom prst="straightConnector1">
+            <a:avLst/>
+          </a:prstGeom>
+          <a:ln>
+            <a:tailEnd type="triangle"/>
+          </a:ln>
+        </p:spPr>
+        <p:style>
+          <a:lnRef idx="1">
+            <a:schemeClr val="accent2"/>
+          </a:lnRef>
+          <a:fillRef idx="0">
+            <a:schemeClr val="accent2"/>
+          </a:fillRef>
+          <a:effectRef idx="0">
+            <a:schemeClr val="accent2"/>
+          </a:effectRef>
+          <a:fontRef idx="minor">
+            <a:schemeClr val="tx1"/>
+          </a:fontRef>
+        </p:style>
+      </p:cxnSp>
     </p:spTree>
     <p:extLst>
       <p:ext uri="{BB962C8B-B14F-4D97-AF65-F5344CB8AC3E}">
-        <p14:creationId xmlns:p14="http://schemas.microsoft.com/office/powerpoint/2010/main" val="2839709660"/>
+        <p14:creationId xmlns:p14="http://schemas.microsoft.com/office/powerpoint/2010/main" val="3912599437"/>
       </p:ext>
     </p:extLst>
   </p:cSld>
@@ -21191,63 +23530,86 @@
           <a:chExt cx="0" cy="0"/>
         </a:xfrm>
       </p:grpSpPr>
-      <p:sp>
-        <p:nvSpPr>
-          <p:cNvPr id="2" name="Title 1">
+      <p:pic>
+        <p:nvPicPr>
+          <p:cNvPr id="3" name="Picture 2">
             <a:extLst>
               <a:ext uri="{FF2B5EF4-FFF2-40B4-BE49-F238E27FC236}">
-                <a16:creationId xmlns:a16="http://schemas.microsoft.com/office/drawing/2014/main" id="{DD76D4BB-914B-B91F-83B4-0A5794C6DDB6}"/>
+                <a16:creationId xmlns:a16="http://schemas.microsoft.com/office/drawing/2014/main" id="{AD1B618A-FBDF-AB73-A679-BC06CE247A4A}"/>
               </a:ext>
             </a:extLst>
           </p:cNvPr>
-          <p:cNvSpPr>
-            <a:spLocks noGrp="1"/>
-          </p:cNvSpPr>
-          <p:nvPr>
-            <p:ph type="title"/>
-          </p:nvPr>
+          <p:cNvPicPr>
+            <a:picLocks noChangeAspect="1"/>
+          </p:cNvPicPr>
+          <p:nvPr/>
+        </p:nvPicPr>
+        <p:blipFill>
+          <a:blip r:embed="rId2"/>
+          <a:stretch>
+            <a:fillRect/>
+          </a:stretch>
+        </p:blipFill>
+        <p:spPr>
+          <a:xfrm>
+            <a:off x="2068481" y="1161853"/>
+            <a:ext cx="8055038" cy="4534293"/>
+          </a:xfrm>
+          <a:prstGeom prst="rect">
+            <a:avLst/>
+          </a:prstGeom>
+        </p:spPr>
+      </p:pic>
+      <p:sp>
+        <p:nvSpPr>
+          <p:cNvPr id="5" name="TextBox 4">
+            <a:extLst>
+              <a:ext uri="{FF2B5EF4-FFF2-40B4-BE49-F238E27FC236}">
+                <a16:creationId xmlns:a16="http://schemas.microsoft.com/office/drawing/2014/main" id="{755A5B43-0954-077E-EB83-DC42B5675273}"/>
+              </a:ext>
+            </a:extLst>
+          </p:cNvPr>
+          <p:cNvSpPr txBox="1"/>
+          <p:nvPr/>
         </p:nvSpPr>
-        <p:spPr/>
+        <p:spPr>
+          <a:xfrm>
+            <a:off x="2068481" y="779910"/>
+            <a:ext cx="8118256" cy="369332"/>
+          </a:xfrm>
+          <a:prstGeom prst="rect">
+            <a:avLst/>
+          </a:prstGeom>
+          <a:solidFill>
+            <a:schemeClr val="accent4"/>
+          </a:solidFill>
+        </p:spPr>
         <p:txBody>
-          <a:bodyPr/>
+          <a:bodyPr wrap="square">
+            <a:spAutoFit/>
+          </a:bodyPr>
           <a:lstStyle/>
           <a:p>
             <a:r>
               <a:rPr lang="en-US" dirty="0"/>
-              <a:t>Analyze worm running processes</a:t>
+              <a:t>Listing Processes by Name (Firefox).</a:t>
             </a:r>
-          </a:p>
-        </p:txBody>
-      </p:sp>
-      <p:sp>
-        <p:nvSpPr>
-          <p:cNvPr id="3" name="Text Placeholder 2">
-            <a:extLst>
-              <a:ext uri="{FF2B5EF4-FFF2-40B4-BE49-F238E27FC236}">
-                <a16:creationId xmlns:a16="http://schemas.microsoft.com/office/drawing/2014/main" id="{781BF53E-5015-A899-3DF5-F13019EDA93D}"/>
-              </a:ext>
-            </a:extLst>
-          </p:cNvPr>
-          <p:cNvSpPr>
-            <a:spLocks noGrp="1"/>
-          </p:cNvSpPr>
-          <p:nvPr>
-            <p:ph type="body" idx="1"/>
-          </p:nvPr>
-        </p:nvSpPr>
-        <p:spPr/>
-        <p:txBody>
-          <a:bodyPr/>
-          <a:lstStyle/>
-          <a:p>
-            <a:endParaRPr lang="en-US"/>
+            <a:r>
+              <a:rPr lang="zh-CN" altLang="en-US" dirty="0"/>
+              <a:t> </a:t>
+            </a:r>
+            <a:r>
+              <a:rPr lang="en-US" altLang="zh-CN" dirty="0"/>
+              <a:t>Firefox is launched in tty0 and observed in tty1</a:t>
+            </a:r>
+            <a:endParaRPr lang="en-US" dirty="0"/>
           </a:p>
         </p:txBody>
       </p:sp>
     </p:spTree>
     <p:extLst>
       <p:ext uri="{BB962C8B-B14F-4D97-AF65-F5344CB8AC3E}">
-        <p14:creationId xmlns:p14="http://schemas.microsoft.com/office/powerpoint/2010/main" val="1232812502"/>
+        <p14:creationId xmlns:p14="http://schemas.microsoft.com/office/powerpoint/2010/main" val="1497295409"/>
       </p:ext>
     </p:extLst>
   </p:cSld>
@@ -21276,10 +23638,40 @@
       </p:grpSpPr>
       <p:pic>
         <p:nvPicPr>
+          <p:cNvPr id="3" name="Picture 2">
+            <a:extLst>
+              <a:ext uri="{FF2B5EF4-FFF2-40B4-BE49-F238E27FC236}">
+                <a16:creationId xmlns:a16="http://schemas.microsoft.com/office/drawing/2014/main" id="{FC4D7DEE-D262-8919-5C91-3070998B6A83}"/>
+              </a:ext>
+            </a:extLst>
+          </p:cNvPr>
+          <p:cNvPicPr>
+            <a:picLocks noChangeAspect="1"/>
+          </p:cNvPicPr>
+          <p:nvPr/>
+        </p:nvPicPr>
+        <p:blipFill>
+          <a:blip r:embed="rId2"/>
+          <a:stretch>
+            <a:fillRect/>
+          </a:stretch>
+        </p:blipFill>
+        <p:spPr>
+          <a:xfrm>
+            <a:off x="1630814" y="2670536"/>
+            <a:ext cx="6569009" cy="2461473"/>
+          </a:xfrm>
+          <a:prstGeom prst="rect">
+            <a:avLst/>
+          </a:prstGeom>
+        </p:spPr>
+      </p:pic>
+      <p:pic>
+        <p:nvPicPr>
           <p:cNvPr id="5" name="Picture 4">
             <a:extLst>
               <a:ext uri="{FF2B5EF4-FFF2-40B4-BE49-F238E27FC236}">
-                <a16:creationId xmlns:a16="http://schemas.microsoft.com/office/drawing/2014/main" id="{3AD7618D-B25E-0AB6-2FD9-593A2131DB8F}"/>
+                <a16:creationId xmlns:a16="http://schemas.microsoft.com/office/drawing/2014/main" id="{A795B884-63A1-3C9F-62ED-BB2BCEFC2E68}"/>
               </a:ext>
             </a:extLst>
           </p:cNvPr>
@@ -21296,8 +23688,8 @@
         </p:blipFill>
         <p:spPr>
           <a:xfrm>
-            <a:off x="964812" y="1704589"/>
-            <a:ext cx="9869955" cy="2610236"/>
+            <a:off x="1630814" y="1201562"/>
+            <a:ext cx="4473328" cy="1219306"/>
           </a:xfrm>
           <a:prstGeom prst="rect">
             <a:avLst/>
@@ -21306,10 +23698,10 @@
       </p:pic>
       <p:sp>
         <p:nvSpPr>
-          <p:cNvPr id="6" name="TextBox 5">
+          <p:cNvPr id="7" name="TextBox 6">
             <a:extLst>
               <a:ext uri="{FF2B5EF4-FFF2-40B4-BE49-F238E27FC236}">
-                <a16:creationId xmlns:a16="http://schemas.microsoft.com/office/drawing/2014/main" id="{AD893021-AB7C-4932-D1C1-B10AB7CE776F}"/>
+                <a16:creationId xmlns:a16="http://schemas.microsoft.com/office/drawing/2014/main" id="{66D05E85-2743-223F-D987-4644C884C98B}"/>
               </a:ext>
             </a:extLst>
           </p:cNvPr>
@@ -21318,104 +23710,8 @@
         </p:nvSpPr>
         <p:spPr>
           <a:xfrm>
-            <a:off x="7694474" y="4644189"/>
-            <a:ext cx="2748935" cy="646331"/>
-          </a:xfrm>
-          <a:prstGeom prst="rect">
-            <a:avLst/>
-          </a:prstGeom>
-          <a:noFill/>
-        </p:spPr>
-        <p:txBody>
-          <a:bodyPr wrap="square" rtlCol="0">
-            <a:spAutoFit/>
-          </a:bodyPr>
-          <a:lstStyle/>
-          <a:p>
-            <a:r>
-              <a:rPr lang="en-US" dirty="0" err="1">
-                <a:latin typeface="Britannic Bold" panose="020B0903060703020204" pitchFamily="34" charset="0"/>
-              </a:rPr>
-              <a:t>nc</a:t>
-            </a:r>
-            <a:r>
-              <a:rPr lang="en-US" dirty="0">
-                <a:latin typeface="Britannic Bold" panose="020B0903060703020204" pitchFamily="34" charset="0"/>
-              </a:rPr>
-              <a:t> </a:t>
-            </a:r>
-            <a:r>
-              <a:rPr lang="en-US" dirty="0"/>
-              <a:t>command</a:t>
-            </a:r>
-          </a:p>
-          <a:p>
-            <a:pPr marL="285750" indent="-285750">
-              <a:buFont typeface="Arial" panose="020B0604020202020204" pitchFamily="34" charset="0"/>
-              <a:buChar char="•"/>
-            </a:pPr>
-            <a:r>
-              <a:rPr lang="en-US" dirty="0"/>
-              <a:t>listen to port 9999</a:t>
-            </a:r>
-          </a:p>
-        </p:txBody>
-      </p:sp>
-      <p:cxnSp>
-        <p:nvCxnSpPr>
-          <p:cNvPr id="8" name="Straight Arrow Connector 7">
-            <a:extLst>
-              <a:ext uri="{FF2B5EF4-FFF2-40B4-BE49-F238E27FC236}">
-                <a16:creationId xmlns:a16="http://schemas.microsoft.com/office/drawing/2014/main" id="{8C2D365D-9F85-E7C1-ADFC-21080F103529}"/>
-              </a:ext>
-            </a:extLst>
-          </p:cNvPr>
-          <p:cNvCxnSpPr/>
-          <p:nvPr/>
-        </p:nvCxnSpPr>
-        <p:spPr>
-          <a:xfrm flipH="1">
-            <a:off x="8085221" y="3601453"/>
-            <a:ext cx="505326" cy="1042736"/>
-          </a:xfrm>
-          <a:prstGeom prst="straightConnector1">
-            <a:avLst/>
-          </a:prstGeom>
-          <a:ln>
-            <a:tailEnd type="triangle"/>
-          </a:ln>
-        </p:spPr>
-        <p:style>
-          <a:lnRef idx="2">
-            <a:schemeClr val="accent4"/>
-          </a:lnRef>
-          <a:fillRef idx="0">
-            <a:schemeClr val="accent4"/>
-          </a:fillRef>
-          <a:effectRef idx="1">
-            <a:schemeClr val="accent4"/>
-          </a:effectRef>
-          <a:fontRef idx="minor">
-            <a:schemeClr val="tx1"/>
-          </a:fontRef>
-        </p:style>
-      </p:cxnSp>
-      <p:sp>
-        <p:nvSpPr>
-          <p:cNvPr id="9" name="TextBox 8">
-            <a:extLst>
-              <a:ext uri="{FF2B5EF4-FFF2-40B4-BE49-F238E27FC236}">
-                <a16:creationId xmlns:a16="http://schemas.microsoft.com/office/drawing/2014/main" id="{A5FB979D-691F-4D6B-DE94-07D68B63E851}"/>
-              </a:ext>
-            </a:extLst>
-          </p:cNvPr>
-          <p:cNvSpPr txBox="1"/>
-          <p:nvPr/>
-        </p:nvSpPr>
-        <p:spPr>
-          <a:xfrm flipH="1">
-            <a:off x="964811" y="1335257"/>
-            <a:ext cx="2716852" cy="369332"/>
+            <a:off x="1630814" y="767228"/>
+            <a:ext cx="3711207" cy="369332"/>
           </a:xfrm>
           <a:prstGeom prst="rect">
             <a:avLst/>
@@ -21425,14 +23721,14 @@
           </a:solidFill>
         </p:spPr>
         <p:txBody>
-          <a:bodyPr wrap="square" rtlCol="0">
+          <a:bodyPr wrap="square">
             <a:spAutoFit/>
           </a:bodyPr>
           <a:lstStyle/>
           <a:p>
             <a:r>
               <a:rPr lang="en-US" dirty="0"/>
-              <a:t>What ports are listening?</a:t>
+              <a:t>Showing Process Hierarchy as a tree</a:t>
             </a:r>
           </a:p>
         </p:txBody>
@@ -21440,7 +23736,7 @@
     </p:spTree>
     <p:extLst>
       <p:ext uri="{BB962C8B-B14F-4D97-AF65-F5344CB8AC3E}">
-        <p14:creationId xmlns:p14="http://schemas.microsoft.com/office/powerpoint/2010/main" val="2170693840"/>
+        <p14:creationId xmlns:p14="http://schemas.microsoft.com/office/powerpoint/2010/main" val="2970851014"/>
       </p:ext>
     </p:extLst>
   </p:cSld>
@@ -21467,63 +23763,155 @@
           <a:chExt cx="0" cy="0"/>
         </a:xfrm>
       </p:grpSpPr>
-      <p:sp>
-        <p:nvSpPr>
-          <p:cNvPr id="2" name="Title 1">
+      <p:pic>
+        <p:nvPicPr>
+          <p:cNvPr id="5" name="Picture 4">
             <a:extLst>
               <a:ext uri="{FF2B5EF4-FFF2-40B4-BE49-F238E27FC236}">
-                <a16:creationId xmlns:a16="http://schemas.microsoft.com/office/drawing/2014/main" id="{48B9C957-31D1-8BE7-8F62-5D4007AEBE49}"/>
+                <a16:creationId xmlns:a16="http://schemas.microsoft.com/office/drawing/2014/main" id="{806B49C9-6A93-B1F6-6F24-7E3B3E1AB15F}"/>
               </a:ext>
             </a:extLst>
           </p:cNvPr>
-          <p:cNvSpPr>
-            <a:spLocks noGrp="1"/>
-          </p:cNvSpPr>
-          <p:nvPr>
-            <p:ph type="title"/>
-          </p:nvPr>
+          <p:cNvPicPr>
+            <a:picLocks noChangeAspect="1"/>
+          </p:cNvPicPr>
+          <p:nvPr/>
+        </p:nvPicPr>
+        <p:blipFill>
+          <a:blip r:embed="rId2"/>
+          <a:stretch>
+            <a:fillRect/>
+          </a:stretch>
+        </p:blipFill>
+        <p:spPr>
+          <a:xfrm>
+            <a:off x="1782247" y="1813042"/>
+            <a:ext cx="6134632" cy="1150720"/>
+          </a:xfrm>
+          <a:prstGeom prst="rect">
+            <a:avLst/>
+          </a:prstGeom>
+        </p:spPr>
+      </p:pic>
+      <p:sp>
+        <p:nvSpPr>
+          <p:cNvPr id="7" name="TextBox 6">
+            <a:extLst>
+              <a:ext uri="{FF2B5EF4-FFF2-40B4-BE49-F238E27FC236}">
+                <a16:creationId xmlns:a16="http://schemas.microsoft.com/office/drawing/2014/main" id="{B01FE742-9EBC-1B44-D281-B4ABB8AD535A}"/>
+              </a:ext>
+            </a:extLst>
+          </p:cNvPr>
+          <p:cNvSpPr txBox="1"/>
+          <p:nvPr/>
         </p:nvSpPr>
-        <p:spPr/>
+        <p:spPr>
+          <a:xfrm>
+            <a:off x="1782247" y="3509210"/>
+            <a:ext cx="7621586" cy="2308324"/>
+          </a:xfrm>
+          <a:prstGeom prst="rect">
+            <a:avLst/>
+          </a:prstGeom>
+          <a:noFill/>
+        </p:spPr>
         <p:txBody>
-          <a:bodyPr/>
+          <a:bodyPr wrap="square">
+            <a:spAutoFit/>
+          </a:bodyPr>
           <a:lstStyle/>
           <a:p>
             <a:r>
-              <a:rPr lang="en-US" dirty="0"/>
-              <a:t>Create a timeline with file timestamps</a:t>
+              <a:rPr lang="en-GB" dirty="0"/>
+              <a:t>UID: The user ID of the owner of this process.</a:t>
             </a:r>
+          </a:p>
+          <a:p>
+            <a:r>
+              <a:rPr lang="en-GB" dirty="0"/>
+              <a:t>PID: The process ID of the process.</a:t>
+            </a:r>
+          </a:p>
+          <a:p>
+            <a:r>
+              <a:rPr lang="en-GB" dirty="0"/>
+              <a:t>PPID: Parent process ID of the process.</a:t>
+            </a:r>
+          </a:p>
+          <a:p>
+            <a:r>
+              <a:rPr lang="en-GB" dirty="0"/>
+              <a:t>C: The number of children the process has.</a:t>
+            </a:r>
+          </a:p>
+          <a:p>
+            <a:r>
+              <a:rPr lang="en-GB" dirty="0"/>
+              <a:t>STIME: Start time. The time when the process commenced.</a:t>
+            </a:r>
+          </a:p>
+          <a:p>
+            <a:r>
+              <a:rPr lang="en-GB" dirty="0"/>
+              <a:t>TTY: The name of the console that the user is logged in at.</a:t>
+            </a:r>
+          </a:p>
+          <a:p>
+            <a:r>
+              <a:rPr lang="en-GB" dirty="0"/>
+              <a:t>TIME: The amount of CPU processing time that the process has used.</a:t>
+            </a:r>
+          </a:p>
+          <a:p>
+            <a:r>
+              <a:rPr lang="en-GB" dirty="0"/>
+              <a:t>CMD: The name of the command that launched the process.</a:t>
+            </a:r>
+            <a:endParaRPr lang="en-US" dirty="0"/>
           </a:p>
         </p:txBody>
       </p:sp>
       <p:sp>
         <p:nvSpPr>
-          <p:cNvPr id="3" name="Text Placeholder 2">
+          <p:cNvPr id="9" name="TextBox 8">
             <a:extLst>
               <a:ext uri="{FF2B5EF4-FFF2-40B4-BE49-F238E27FC236}">
-                <a16:creationId xmlns:a16="http://schemas.microsoft.com/office/drawing/2014/main" id="{8551E564-23F0-3656-FC22-8BF6B1C4299E}"/>
+                <a16:creationId xmlns:a16="http://schemas.microsoft.com/office/drawing/2014/main" id="{AE103956-E587-28D5-0AE8-31BB0F181DBA}"/>
               </a:ext>
             </a:extLst>
           </p:cNvPr>
-          <p:cNvSpPr>
-            <a:spLocks noGrp="1"/>
-          </p:cNvSpPr>
-          <p:nvPr>
-            <p:ph type="body" idx="1"/>
-          </p:nvPr>
+          <p:cNvSpPr txBox="1"/>
+          <p:nvPr/>
         </p:nvSpPr>
-        <p:spPr/>
+        <p:spPr>
+          <a:xfrm>
+            <a:off x="1782247" y="1443710"/>
+            <a:ext cx="2733606" cy="369332"/>
+          </a:xfrm>
+          <a:prstGeom prst="rect">
+            <a:avLst/>
+          </a:prstGeom>
+          <a:solidFill>
+            <a:schemeClr val="accent4"/>
+          </a:solidFill>
+        </p:spPr>
         <p:txBody>
-          <a:bodyPr/>
+          <a:bodyPr wrap="square">
+            <a:spAutoFit/>
+          </a:bodyPr>
           <a:lstStyle/>
           <a:p>
-            <a:endParaRPr lang="en-US"/>
+            <a:r>
+              <a:rPr lang="en-US" dirty="0"/>
+              <a:t>Showing full-format </a:t>
+            </a:r>
           </a:p>
         </p:txBody>
       </p:sp>
     </p:spTree>
     <p:extLst>
       <p:ext uri="{BB962C8B-B14F-4D97-AF65-F5344CB8AC3E}">
-        <p14:creationId xmlns:p14="http://schemas.microsoft.com/office/powerpoint/2010/main" val="304707683"/>
+        <p14:creationId xmlns:p14="http://schemas.microsoft.com/office/powerpoint/2010/main" val="3945441786"/>
       </p:ext>
     </p:extLst>
   </p:cSld>

</xml_diff>